<commit_message>
Correciones de power points
</commit_message>
<xml_diff>
--- a/[Jueves] Laboratorio/Clase 2 [26-08]/2. ProgramacionII_Clase_02-2018.pptx
+++ b/[Jueves] Laboratorio/Clase 2 [26-08]/2. ProgramacionII_Clase_02-2018.pptx
@@ -231,7 +231,7 @@
           <a:p>
             <a:fld id="{D0683491-89D4-49E1-9471-94C7F2E3C116}" type="datetimeFigureOut">
               <a:rPr lang="es-AR" smtClean="0"/>
-              <a:t>19/03/2019</a:t>
+              <a:t>27/9/2021</a:t>
             </a:fld>
             <a:endParaRPr lang="es-AR"/>
           </a:p>
@@ -295,35 +295,35 @@
           <a:p>
             <a:pPr lvl="0"/>
             <a:r>
-              <a:rPr lang="es-ES" smtClean="0"/>
+              <a:rPr lang="es-ES"/>
               <a:t>Haga clic para modificar el estilo de texto del patrón</a:t>
             </a:r>
           </a:p>
           <a:p>
             <a:pPr lvl="1"/>
             <a:r>
-              <a:rPr lang="es-ES" smtClean="0"/>
+              <a:rPr lang="es-ES"/>
               <a:t>Segundo nivel</a:t>
             </a:r>
           </a:p>
           <a:p>
             <a:pPr lvl="2"/>
             <a:r>
-              <a:rPr lang="es-ES" smtClean="0"/>
+              <a:rPr lang="es-ES"/>
               <a:t>Tercer nivel</a:t>
             </a:r>
           </a:p>
           <a:p>
             <a:pPr lvl="3"/>
             <a:r>
-              <a:rPr lang="es-ES" smtClean="0"/>
+              <a:rPr lang="es-ES"/>
               <a:t>Cuarto nivel</a:t>
             </a:r>
           </a:p>
           <a:p>
             <a:pPr lvl="4"/>
             <a:r>
-              <a:rPr lang="es-ES" smtClean="0"/>
+              <a:rPr lang="es-ES"/>
               <a:t>Quinto nivel</a:t>
             </a:r>
             <a:endParaRPr lang="es-AR"/>
@@ -544,10 +544,9 @@
           <a:lstStyle/>
           <a:p>
             <a:r>
-              <a:rPr lang="es-AR" dirty="0" smtClean="0"/>
+              <a:rPr lang="es-AR" dirty="0"/>
               <a:t>PILARES</a:t>
             </a:r>
-            <a:endParaRPr lang="es-AR" dirty="0"/>
           </a:p>
         </p:txBody>
       </p:sp>
@@ -633,7 +632,7 @@
           <a:p>
             <a:pPr eaLnBrk="1" hangingPunct="1"/>
             <a:r>
-              <a:rPr lang="es-AR" altLang="es-AR" dirty="0" smtClean="0">
+              <a:rPr lang="es-AR" altLang="es-AR" dirty="0">
                 <a:latin typeface="Arial" panose="020B0604020202020204" pitchFamily="34" charset="0"/>
               </a:rPr>
               <a:t>La herencia es uno de los conceptos más cruciales en la POO. La herencia básicamente consiste en que una clase puede heredar sus variables y métodos a varias subclases (la clase que hereda es llamada superclase o clase padre). Esto significa que una subclase, aparte de los atributos y métodos propios, tiene incorporados los atributos y métodos heredados de la superclase. De esta manera se crea una jerarquía de herencia. </a:t>
@@ -641,14 +640,14 @@
           </a:p>
           <a:p>
             <a:pPr eaLnBrk="1" hangingPunct="1"/>
-            <a:endParaRPr lang="es-AR" altLang="es-AR" dirty="0" smtClean="0">
+            <a:endParaRPr lang="es-AR" altLang="es-AR" dirty="0">
               <a:latin typeface="Arial" panose="020B0604020202020204" pitchFamily="34" charset="0"/>
             </a:endParaRPr>
           </a:p>
           <a:p>
             <a:pPr eaLnBrk="1" hangingPunct="1"/>
             <a:r>
-              <a:rPr lang="es-AR" altLang="es-AR" dirty="0" smtClean="0">
+              <a:rPr lang="es-AR" altLang="es-AR" dirty="0">
                 <a:latin typeface="Arial" panose="020B0604020202020204" pitchFamily="34" charset="0"/>
               </a:rPr>
               <a:t>Relación “es un” significa que la clase hija (o heredera), es, además, lo mismo que su padre. Es decir, un auto “es un” transporte, un caballo “es un” animal, etc.</a:t>
@@ -656,50 +655,50 @@
           </a:p>
           <a:p>
             <a:pPr eaLnBrk="1" hangingPunct="1"/>
-            <a:endParaRPr lang="es-AR" altLang="es-AR" dirty="0" smtClean="0">
+            <a:endParaRPr lang="es-AR" altLang="es-AR" dirty="0">
               <a:latin typeface="Arial" panose="020B0604020202020204" pitchFamily="34" charset="0"/>
             </a:endParaRPr>
           </a:p>
           <a:p>
             <a:pPr eaLnBrk="1" hangingPunct="1"/>
             <a:r>
-              <a:rPr lang="es-AR" altLang="es-AR" dirty="0" smtClean="0">
+              <a:rPr lang="es-AR" altLang="es-AR" dirty="0">
                 <a:latin typeface="Arial" panose="020B0604020202020204" pitchFamily="34" charset="0"/>
               </a:rPr>
               <a:t>Estos pueden compartir (y extender) su comportamiento sin tener que re implementar su comportamiento. Esto suele hacerse habitualmente agrupando los objetos en </a:t>
             </a:r>
             <a:r>
-              <a:rPr lang="es-AR" altLang="es-AR" i="1" dirty="0" smtClean="0">
+              <a:rPr lang="es-AR" altLang="es-AR" i="1" dirty="0">
                 <a:latin typeface="Arial" panose="020B0604020202020204" pitchFamily="34" charset="0"/>
               </a:rPr>
               <a:t>clases</a:t>
             </a:r>
             <a:r>
-              <a:rPr lang="es-AR" altLang="es-AR" dirty="0" smtClean="0">
+              <a:rPr lang="es-AR" altLang="es-AR" dirty="0">
                 <a:latin typeface="Arial" panose="020B0604020202020204" pitchFamily="34" charset="0"/>
               </a:rPr>
               <a:t> y las clases en </a:t>
             </a:r>
             <a:r>
-              <a:rPr lang="es-AR" altLang="es-AR" i="1" dirty="0" smtClean="0">
+              <a:rPr lang="es-AR" altLang="es-AR" i="1" dirty="0">
                 <a:latin typeface="Arial" panose="020B0604020202020204" pitchFamily="34" charset="0"/>
               </a:rPr>
               <a:t>árboles</a:t>
             </a:r>
             <a:r>
-              <a:rPr lang="es-AR" altLang="es-AR" dirty="0" smtClean="0">
+              <a:rPr lang="es-AR" altLang="es-AR" dirty="0">
                 <a:latin typeface="Arial" panose="020B0604020202020204" pitchFamily="34" charset="0"/>
               </a:rPr>
               <a:t> o </a:t>
             </a:r>
             <a:r>
-              <a:rPr lang="es-AR" altLang="es-AR" i="1" dirty="0" smtClean="0">
+              <a:rPr lang="es-AR" altLang="es-AR" i="1" dirty="0">
                 <a:latin typeface="Arial" panose="020B0604020202020204" pitchFamily="34" charset="0"/>
               </a:rPr>
               <a:t>enrejados</a:t>
             </a:r>
             <a:r>
-              <a:rPr lang="es-AR" altLang="es-AR" dirty="0" smtClean="0">
+              <a:rPr lang="es-AR" altLang="es-AR" dirty="0">
                 <a:latin typeface="Arial" panose="020B0604020202020204" pitchFamily="34" charset="0"/>
               </a:rPr>
               <a:t> que reflejan un comportamiento común. </a:t>
@@ -707,7 +706,7 @@
           </a:p>
           <a:p>
             <a:pPr eaLnBrk="1" hangingPunct="1"/>
-            <a:endParaRPr lang="es-ES" altLang="es-AR" dirty="0" smtClean="0">
+            <a:endParaRPr lang="es-ES" altLang="es-AR" dirty="0">
               <a:latin typeface="Arial" panose="020B0604020202020204" pitchFamily="34" charset="0"/>
             </a:endParaRPr>
           </a:p>
@@ -814,19 +813,19 @@
               <a:defRPr/>
             </a:pPr>
             <a:r>
-              <a:rPr lang="es-AR" altLang="es-AR" dirty="0" smtClean="0">
+              <a:rPr lang="es-AR" altLang="es-AR" dirty="0">
                 <a:latin typeface="Arial" panose="020B0604020202020204" pitchFamily="34" charset="0"/>
               </a:rPr>
               <a:t>El término de polimorfismo también define la capacidad de que más de un objeto puedan crearse usando la misma clase de base para lograr dos conceptos de objetos diferentes, en este caso podemos citar el típico ejemplo de los teléfonos, los cuales se basan en un teléfono base, con la capacidad de hacer </a:t>
             </a:r>
             <a:r>
-              <a:rPr lang="es-AR" altLang="es-AR" i="1" dirty="0" smtClean="0">
+              <a:rPr lang="es-AR" altLang="es-AR" i="1" dirty="0">
                 <a:latin typeface="Arial" panose="020B0604020202020204" pitchFamily="34" charset="0"/>
               </a:rPr>
               <a:t>ring</a:t>
             </a:r>
             <a:r>
-              <a:rPr lang="es-AR" altLang="es-AR" dirty="0" smtClean="0">
+              <a:rPr lang="es-AR" altLang="es-AR" dirty="0">
                 <a:latin typeface="Arial" panose="020B0604020202020204" pitchFamily="34" charset="0"/>
               </a:rPr>
               <a:t> y tener un auricular, para luego obtener un teléfono digital, inalámbrico, con botonera de marcado y también, tomando la misma base, construir un teléfono analógico y con disco de marcado. </a:t>
@@ -919,7 +918,7 @@
           <a:p>
             <a:pPr eaLnBrk="1" hangingPunct="1"/>
             <a:r>
-              <a:rPr lang="es-AR" altLang="es-AR" dirty="0" smtClean="0">
+              <a:rPr lang="es-AR" altLang="es-AR" dirty="0">
                 <a:latin typeface="Arial" panose="020B0604020202020204" pitchFamily="34" charset="0"/>
               </a:rPr>
               <a:t>Las clases son declaraciones de objetos, también se podrían definir como abstracciones de objetos. Esto quiere decir que la definición de un objeto es la clase. Cuando programamos un objeto y definimos sus características y funcionalidades en realidad lo que estamos haciendo es programar una clase. </a:t>
@@ -927,14 +926,14 @@
           </a:p>
           <a:p>
             <a:pPr eaLnBrk="1" hangingPunct="1"/>
-            <a:endParaRPr lang="es-AR" altLang="es-AR" dirty="0" smtClean="0">
+            <a:endParaRPr lang="es-AR" altLang="es-AR" dirty="0">
               <a:latin typeface="Arial" panose="020B0604020202020204" pitchFamily="34" charset="0"/>
             </a:endParaRPr>
           </a:p>
           <a:p>
             <a:pPr eaLnBrk="1" hangingPunct="1"/>
             <a:r>
-              <a:rPr lang="es-CR" altLang="es-AR" dirty="0" smtClean="0">
+              <a:rPr lang="es-CR" altLang="es-AR" dirty="0">
                 <a:latin typeface="Arial" panose="020B0604020202020204" pitchFamily="34" charset="0"/>
                 <a:sym typeface="Wingdings" panose="05000000000000000000" pitchFamily="2" charset="2"/>
               </a:rPr>
@@ -1040,7 +1039,7 @@
               <a:tabLst/>
               <a:defRPr/>
             </a:pPr>
-            <a:endParaRPr lang="en-US" altLang="es-AR" dirty="0" smtClean="0">
+            <a:endParaRPr lang="en-US" altLang="es-AR" dirty="0">
               <a:latin typeface="Arial" panose="020B0604020202020204" pitchFamily="34" charset="0"/>
             </a:endParaRPr>
           </a:p>
@@ -1073,6 +1072,90 @@
     <p:extLst>
       <p:ext uri="{BB962C8B-B14F-4D97-AF65-F5344CB8AC3E}">
         <p14:creationId xmlns:p14="http://schemas.microsoft.com/office/powerpoint/2010/main" val="2960439626"/>
+      </p:ext>
+    </p:extLst>
+  </p:cSld>
+  <p:clrMapOvr>
+    <a:masterClrMapping/>
+  </p:clrMapOvr>
+</p:notes>
+</file>
+
+<file path=ppt/notesSlides/notesSlide6.xml><?xml version="1.0" encoding="utf-8"?>
+<p:notes xmlns:a="http://schemas.openxmlformats.org/drawingml/2006/main" xmlns:r="http://schemas.openxmlformats.org/officeDocument/2006/relationships" xmlns:p="http://schemas.openxmlformats.org/presentationml/2006/main">
+  <p:cSld>
+    <p:spTree>
+      <p:nvGrpSpPr>
+        <p:cNvPr id="1" name=""/>
+        <p:cNvGrpSpPr/>
+        <p:nvPr/>
+      </p:nvGrpSpPr>
+      <p:grpSpPr>
+        <a:xfrm>
+          <a:off x="0" y="0"/>
+          <a:ext cx="0" cy="0"/>
+          <a:chOff x="0" y="0"/>
+          <a:chExt cx="0" cy="0"/>
+        </a:xfrm>
+      </p:grpSpPr>
+      <p:sp>
+        <p:nvSpPr>
+          <p:cNvPr id="2" name="Marcador de imagen de diapositiva 1"/>
+          <p:cNvSpPr>
+            <a:spLocks noGrp="1" noRot="1" noChangeAspect="1"/>
+          </p:cNvSpPr>
+          <p:nvPr>
+            <p:ph type="sldImg"/>
+          </p:nvPr>
+        </p:nvSpPr>
+        <p:spPr/>
+      </p:sp>
+      <p:sp>
+        <p:nvSpPr>
+          <p:cNvPr id="3" name="Marcador de notas 2"/>
+          <p:cNvSpPr>
+            <a:spLocks noGrp="1"/>
+          </p:cNvSpPr>
+          <p:nvPr>
+            <p:ph type="body" idx="1"/>
+          </p:nvPr>
+        </p:nvSpPr>
+        <p:spPr/>
+        <p:txBody>
+          <a:bodyPr/>
+          <a:lstStyle/>
+          <a:p>
+            <a:endParaRPr lang="es-ES" dirty="0"/>
+          </a:p>
+        </p:txBody>
+      </p:sp>
+      <p:sp>
+        <p:nvSpPr>
+          <p:cNvPr id="4" name="Marcador de número de diapositiva 3"/>
+          <p:cNvSpPr>
+            <a:spLocks noGrp="1"/>
+          </p:cNvSpPr>
+          <p:nvPr>
+            <p:ph type="sldNum" sz="quarter" idx="5"/>
+          </p:nvPr>
+        </p:nvSpPr>
+        <p:spPr/>
+        <p:txBody>
+          <a:bodyPr/>
+          <a:lstStyle/>
+          <a:p>
+            <a:fld id="{1FBD2CA0-9C61-4239-A28D-F73B9C6EE9A8}" type="slidenum">
+              <a:rPr lang="es-AR" smtClean="0"/>
+              <a:t>10</a:t>
+            </a:fld>
+            <a:endParaRPr lang="es-AR"/>
+          </a:p>
+        </p:txBody>
+      </p:sp>
+    </p:spTree>
+    <p:extLst>
+      <p:ext uri="{BB962C8B-B14F-4D97-AF65-F5344CB8AC3E}">
+        <p14:creationId xmlns:p14="http://schemas.microsoft.com/office/powerpoint/2010/main" val="3101398999"/>
       </p:ext>
     </p:extLst>
   </p:cSld>
@@ -1265,7 +1348,7 @@
           </a:lstStyle>
           <a:p>
             <a:r>
-              <a:rPr lang="es-ES" smtClean="0"/>
+              <a:rPr lang="es-ES"/>
               <a:t>Haga clic para modificar el estilo de título del patrón</a:t>
             </a:r>
             <a:endParaRPr lang="en-US" dirty="0"/>
@@ -1332,7 +1415,7 @@
           </a:lstStyle>
           <a:p>
             <a:r>
-              <a:rPr lang="es-ES" smtClean="0"/>
+              <a:rPr lang="es-ES"/>
               <a:t>Haga clic para modificar el estilo de subtítulo del patrón</a:t>
             </a:r>
             <a:endParaRPr lang="en-US" dirty="0"/>
@@ -1356,7 +1439,7 @@
           <a:p>
             <a:fld id="{78ABE3C1-DBE1-495D-B57B-2849774B866A}" type="datetimeFigureOut">
               <a:rPr lang="en-US" dirty="0"/>
-              <a:t>3/19/2019</a:t>
+              <a:t>9/27/2021</a:t>
             </a:fld>
             <a:endParaRPr lang="en-US" dirty="0"/>
           </a:p>
@@ -1600,7 +1683,7 @@
           </a:lstStyle>
           <a:p>
             <a:r>
-              <a:rPr lang="es-ES" smtClean="0"/>
+              <a:rPr lang="es-ES"/>
               <a:t>Haga clic para modificar el estilo de título del patrón</a:t>
             </a:r>
             <a:endParaRPr lang="en-US" dirty="0"/>
@@ -1676,7 +1759,7 @@
           </a:lstStyle>
           <a:p>
             <a:r>
-              <a:rPr lang="es-ES" smtClean="0"/>
+              <a:rPr lang="es-ES"/>
               <a:t>Haga clic en el icono para agregar una imagen</a:t>
             </a:r>
             <a:endParaRPr lang="en-US" dirty="0"/>
@@ -1742,7 +1825,7 @@
           <a:p>
             <a:pPr lvl="0"/>
             <a:r>
-              <a:rPr lang="es-ES" smtClean="0"/>
+              <a:rPr lang="es-ES"/>
               <a:t>Haga clic para modificar el estilo de texto del patrón</a:t>
             </a:r>
           </a:p>
@@ -1765,7 +1848,7 @@
           <a:p>
             <a:fld id="{446C117F-5CCF-4837-BE5F-2B92066CAFAF}" type="datetimeFigureOut">
               <a:rPr lang="en-US" dirty="0"/>
-              <a:t>3/19/2019</a:t>
+              <a:t>9/27/2021</a:t>
             </a:fld>
             <a:endParaRPr lang="en-US" dirty="0"/>
           </a:p>
@@ -2007,7 +2090,7 @@
           </a:lstStyle>
           <a:p>
             <a:r>
-              <a:rPr lang="es-ES" smtClean="0"/>
+              <a:rPr lang="es-ES"/>
               <a:t>Haga clic para modificar el estilo de título del patrón</a:t>
             </a:r>
             <a:endParaRPr lang="en-US" dirty="0"/>
@@ -2073,7 +2156,7 @@
           <a:p>
             <a:pPr lvl="0"/>
             <a:r>
-              <a:rPr lang="es-ES" smtClean="0"/>
+              <a:rPr lang="es-ES"/>
               <a:t>Haga clic para modificar el estilo de texto del patrón</a:t>
             </a:r>
           </a:p>
@@ -2096,7 +2179,7 @@
           <a:p>
             <a:fld id="{84EB90BD-B6CE-46B7-997F-7313B992CCDC}" type="datetimeFigureOut">
               <a:rPr lang="en-US" dirty="0"/>
-              <a:t>3/19/2019</a:t>
+              <a:t>9/27/2021</a:t>
             </a:fld>
             <a:endParaRPr lang="en-US" dirty="0"/>
           </a:p>
@@ -2338,7 +2421,7 @@
           </a:lstStyle>
           <a:p>
             <a:r>
-              <a:rPr lang="es-ES" smtClean="0"/>
+              <a:rPr lang="es-ES"/>
               <a:t>Haga clic para modificar el estilo de título del patrón</a:t>
             </a:r>
             <a:endParaRPr lang="en-US" dirty="0"/>
@@ -2406,7 +2489,7 @@
           <a:p>
             <a:pPr lvl="0"/>
             <a:r>
-              <a:rPr lang="es-ES" smtClean="0"/>
+              <a:rPr lang="es-ES"/>
               <a:t>Haga clic para modificar el estilo de texto del patrón</a:t>
             </a:r>
           </a:p>
@@ -2473,7 +2556,7 @@
           <a:p>
             <a:pPr lvl="0"/>
             <a:r>
-              <a:rPr lang="es-ES" smtClean="0"/>
+              <a:rPr lang="es-ES"/>
               <a:t>Haga clic para modificar el estilo de texto del patrón</a:t>
             </a:r>
           </a:p>
@@ -2496,7 +2579,7 @@
           <a:p>
             <a:fld id="{CDB9D11F-B188-461D-B23F-39381795C052}" type="datetimeFigureOut">
               <a:rPr lang="en-US" dirty="0"/>
-              <a:t>3/19/2019</a:t>
+              <a:t>9/27/2021</a:t>
             </a:fld>
             <a:endParaRPr lang="en-US" dirty="0"/>
           </a:p>
@@ -2970,7 +3053,7 @@
           </a:lstStyle>
           <a:p>
             <a:r>
-              <a:rPr lang="es-ES" smtClean="0"/>
+              <a:rPr lang="es-ES"/>
               <a:t>Haga clic para modificar el estilo de título del patrón</a:t>
             </a:r>
             <a:endParaRPr lang="en-US" dirty="0"/>
@@ -3036,7 +3119,7 @@
           <a:p>
             <a:pPr lvl="0"/>
             <a:r>
-              <a:rPr lang="es-ES" smtClean="0"/>
+              <a:rPr lang="es-ES"/>
               <a:t>Haga clic para modificar el estilo de texto del patrón</a:t>
             </a:r>
           </a:p>
@@ -3059,7 +3142,7 @@
           <a:p>
             <a:fld id="{52E6D8D9-55A2-4063-B0F3-121F44549695}" type="datetimeFigureOut">
               <a:rPr lang="en-US" dirty="0"/>
-              <a:t>3/19/2019</a:t>
+              <a:t>9/27/2021</a:t>
             </a:fld>
             <a:endParaRPr lang="en-US" dirty="0"/>
           </a:p>
@@ -3297,7 +3380,7 @@
           <a:lstStyle/>
           <a:p>
             <a:r>
-              <a:rPr lang="es-ES" smtClean="0"/>
+              <a:rPr lang="es-ES"/>
               <a:t>Haga clic para modificar el estilo de título del patrón</a:t>
             </a:r>
             <a:endParaRPr lang="en-US" dirty="0"/>
@@ -3369,7 +3452,7 @@
           <a:p>
             <a:pPr lvl="0"/>
             <a:r>
-              <a:rPr lang="es-ES" smtClean="0"/>
+              <a:rPr lang="es-ES"/>
               <a:t>Haga clic para modificar el estilo de texto del patrón</a:t>
             </a:r>
           </a:p>
@@ -3436,7 +3519,7 @@
           <a:p>
             <a:pPr lvl="0"/>
             <a:r>
-              <a:rPr lang="es-ES" smtClean="0"/>
+              <a:rPr lang="es-ES"/>
               <a:t>Haga clic para modificar el estilo de texto del patrón</a:t>
             </a:r>
           </a:p>
@@ -3507,7 +3590,7 @@
           <a:p>
             <a:pPr lvl="0"/>
             <a:r>
-              <a:rPr lang="es-ES" smtClean="0"/>
+              <a:rPr lang="es-ES"/>
               <a:t>Haga clic para modificar el estilo de texto del patrón</a:t>
             </a:r>
           </a:p>
@@ -3574,7 +3657,7 @@
           <a:p>
             <a:pPr lvl="0"/>
             <a:r>
-              <a:rPr lang="es-ES" smtClean="0"/>
+              <a:rPr lang="es-ES"/>
               <a:t>Haga clic para modificar el estilo de texto del patrón</a:t>
             </a:r>
           </a:p>
@@ -3645,7 +3728,7 @@
           <a:p>
             <a:pPr lvl="0"/>
             <a:r>
-              <a:rPr lang="es-ES" smtClean="0"/>
+              <a:rPr lang="es-ES"/>
               <a:t>Haga clic para modificar el estilo de texto del patrón</a:t>
             </a:r>
           </a:p>
@@ -3712,7 +3795,7 @@
           <a:p>
             <a:pPr lvl="0"/>
             <a:r>
-              <a:rPr lang="es-ES" smtClean="0"/>
+              <a:rPr lang="es-ES"/>
               <a:t>Haga clic para modificar el estilo de texto del patrón</a:t>
             </a:r>
           </a:p>
@@ -3735,7 +3818,7 @@
           <a:p>
             <a:fld id="{D4B24536-994D-4021-A283-9F449C0DB509}" type="datetimeFigureOut">
               <a:rPr lang="en-US" dirty="0"/>
-              <a:t>3/19/2019</a:t>
+              <a:t>9/27/2021</a:t>
             </a:fld>
             <a:endParaRPr lang="en-US" dirty="0"/>
           </a:p>
@@ -3968,7 +4051,7 @@
           <a:lstStyle/>
           <a:p>
             <a:r>
-              <a:rPr lang="es-ES" smtClean="0"/>
+              <a:rPr lang="es-ES"/>
               <a:t>Haga clic para modificar el estilo de título del patrón</a:t>
             </a:r>
             <a:endParaRPr lang="en-US" dirty="0"/>
@@ -4040,7 +4123,7 @@
           <a:p>
             <a:pPr lvl="0"/>
             <a:r>
-              <a:rPr lang="es-ES" smtClean="0"/>
+              <a:rPr lang="es-ES"/>
               <a:t>Haga clic para modificar el estilo de texto del patrón</a:t>
             </a:r>
           </a:p>
@@ -4118,7 +4201,7 @@
           </a:lstStyle>
           <a:p>
             <a:r>
-              <a:rPr lang="es-ES" smtClean="0"/>
+              <a:rPr lang="es-ES"/>
               <a:t>Haga clic en el icono para agregar una imagen</a:t>
             </a:r>
             <a:endParaRPr lang="en-US" dirty="0"/>
@@ -4186,7 +4269,7 @@
           <a:p>
             <a:pPr lvl="0"/>
             <a:r>
-              <a:rPr lang="es-ES" smtClean="0"/>
+              <a:rPr lang="es-ES"/>
               <a:t>Haga clic para modificar el estilo de texto del patrón</a:t>
             </a:r>
           </a:p>
@@ -4257,7 +4340,7 @@
           <a:p>
             <a:pPr lvl="0"/>
             <a:r>
-              <a:rPr lang="es-ES" smtClean="0"/>
+              <a:rPr lang="es-ES"/>
               <a:t>Haga clic para modificar el estilo de texto del patrón</a:t>
             </a:r>
           </a:p>
@@ -4335,7 +4418,7 @@
           </a:lstStyle>
           <a:p>
             <a:r>
-              <a:rPr lang="es-ES" smtClean="0"/>
+              <a:rPr lang="es-ES"/>
               <a:t>Haga clic en el icono para agregar una imagen</a:t>
             </a:r>
             <a:endParaRPr lang="en-US" dirty="0"/>
@@ -4403,7 +4486,7 @@
           <a:p>
             <a:pPr lvl="0"/>
             <a:r>
-              <a:rPr lang="es-ES" smtClean="0"/>
+              <a:rPr lang="es-ES"/>
               <a:t>Haga clic para modificar el estilo de texto del patrón</a:t>
             </a:r>
           </a:p>
@@ -4474,7 +4557,7 @@
           <a:p>
             <a:pPr lvl="0"/>
             <a:r>
-              <a:rPr lang="es-ES" smtClean="0"/>
+              <a:rPr lang="es-ES"/>
               <a:t>Haga clic para modificar el estilo de texto del patrón</a:t>
             </a:r>
           </a:p>
@@ -4552,7 +4635,7 @@
           </a:lstStyle>
           <a:p>
             <a:r>
-              <a:rPr lang="es-ES" smtClean="0"/>
+              <a:rPr lang="es-ES"/>
               <a:t>Haga clic en el icono para agregar una imagen</a:t>
             </a:r>
             <a:endParaRPr lang="en-US" dirty="0"/>
@@ -4620,7 +4703,7 @@
           <a:p>
             <a:pPr lvl="0"/>
             <a:r>
-              <a:rPr lang="es-ES" smtClean="0"/>
+              <a:rPr lang="es-ES"/>
               <a:t>Haga clic para modificar el estilo de texto del patrón</a:t>
             </a:r>
           </a:p>
@@ -4643,7 +4726,7 @@
           <a:p>
             <a:fld id="{3CBBBB78-C96F-47B7-AB17-D852CA960AC9}" type="datetimeFigureOut">
               <a:rPr lang="en-US" dirty="0"/>
-              <a:t>3/19/2019</a:t>
+              <a:t>9/27/2021</a:t>
             </a:fld>
             <a:endParaRPr lang="en-US" dirty="0"/>
           </a:p>
@@ -4875,7 +4958,7 @@
           </a:lstStyle>
           <a:p>
             <a:r>
-              <a:rPr lang="es-ES" smtClean="0"/>
+              <a:rPr lang="es-ES"/>
               <a:t>Haga clic para modificar el estilo de título del patrón</a:t>
             </a:r>
             <a:endParaRPr lang="en-US" dirty="0"/>
@@ -4899,35 +4982,35 @@
           <a:p>
             <a:pPr lvl="0"/>
             <a:r>
-              <a:rPr lang="es-ES" smtClean="0"/>
+              <a:rPr lang="es-ES"/>
               <a:t>Haga clic para modificar el estilo de texto del patrón</a:t>
             </a:r>
           </a:p>
           <a:p>
             <a:pPr lvl="1"/>
             <a:r>
-              <a:rPr lang="es-ES" smtClean="0"/>
+              <a:rPr lang="es-ES"/>
               <a:t>Segundo nivel</a:t>
             </a:r>
           </a:p>
           <a:p>
             <a:pPr lvl="2"/>
             <a:r>
-              <a:rPr lang="es-ES" smtClean="0"/>
+              <a:rPr lang="es-ES"/>
               <a:t>Tercer nivel</a:t>
             </a:r>
           </a:p>
           <a:p>
             <a:pPr lvl="3"/>
             <a:r>
-              <a:rPr lang="es-ES" smtClean="0"/>
+              <a:rPr lang="es-ES"/>
               <a:t>Cuarto nivel</a:t>
             </a:r>
           </a:p>
           <a:p>
             <a:pPr lvl="4"/>
             <a:r>
-              <a:rPr lang="es-ES" smtClean="0"/>
+              <a:rPr lang="es-ES"/>
               <a:t>Quinto nivel</a:t>
             </a:r>
             <a:endParaRPr lang="en-US" dirty="0"/>
@@ -4951,7 +5034,7 @@
           <a:p>
             <a:fld id="{1FA3F48C-C7C6-4055-9F49-3777875E72AE}" type="datetimeFigureOut">
               <a:rPr lang="en-US" dirty="0"/>
-              <a:t>3/19/2019</a:t>
+              <a:t>9/27/2021</a:t>
             </a:fld>
             <a:endParaRPr lang="en-US" dirty="0"/>
           </a:p>
@@ -5124,7 +5207,7 @@
           <a:lstStyle/>
           <a:p>
             <a:r>
-              <a:rPr lang="es-ES" smtClean="0"/>
+              <a:rPr lang="es-ES"/>
               <a:t>Haga clic para modificar el estilo de título del patrón</a:t>
             </a:r>
             <a:endParaRPr lang="en-US" dirty="0"/>
@@ -5153,35 +5236,35 @@
           <a:p>
             <a:pPr lvl="0"/>
             <a:r>
-              <a:rPr lang="es-ES" smtClean="0"/>
+              <a:rPr lang="es-ES"/>
               <a:t>Haga clic para modificar el estilo de texto del patrón</a:t>
             </a:r>
           </a:p>
           <a:p>
             <a:pPr lvl="1"/>
             <a:r>
-              <a:rPr lang="es-ES" smtClean="0"/>
+              <a:rPr lang="es-ES"/>
               <a:t>Segundo nivel</a:t>
             </a:r>
           </a:p>
           <a:p>
             <a:pPr lvl="2"/>
             <a:r>
-              <a:rPr lang="es-ES" smtClean="0"/>
+              <a:rPr lang="es-ES"/>
               <a:t>Tercer nivel</a:t>
             </a:r>
           </a:p>
           <a:p>
             <a:pPr lvl="3"/>
             <a:r>
-              <a:rPr lang="es-ES" smtClean="0"/>
+              <a:rPr lang="es-ES"/>
               <a:t>Cuarto nivel</a:t>
             </a:r>
           </a:p>
           <a:p>
             <a:pPr lvl="4"/>
             <a:r>
-              <a:rPr lang="es-ES" smtClean="0"/>
+              <a:rPr lang="es-ES"/>
               <a:t>Quinto nivel</a:t>
             </a:r>
             <a:endParaRPr lang="en-US" dirty="0"/>
@@ -5210,7 +5293,7 @@
           <a:p>
             <a:fld id="{6178E61D-D431-422C-9764-11DAFE33AB63}" type="datetimeFigureOut">
               <a:rPr lang="en-US" dirty="0"/>
-              <a:t>3/19/2019</a:t>
+              <a:t>9/27/2021</a:t>
             </a:fld>
             <a:endParaRPr lang="en-US" dirty="0"/>
           </a:p>
@@ -5453,7 +5536,7 @@
           <a:lstStyle/>
           <a:p>
             <a:r>
-              <a:rPr lang="es-ES" smtClean="0"/>
+              <a:rPr lang="es-ES"/>
               <a:t>Haga clic para modificar el estilo de título del patrón</a:t>
             </a:r>
             <a:endParaRPr lang="en-US" dirty="0"/>
@@ -5477,35 +5560,35 @@
           <a:p>
             <a:pPr lvl="0"/>
             <a:r>
-              <a:rPr lang="es-ES" smtClean="0"/>
+              <a:rPr lang="es-ES"/>
               <a:t>Haga clic para modificar el estilo de texto del patrón</a:t>
             </a:r>
           </a:p>
           <a:p>
             <a:pPr lvl="1"/>
             <a:r>
-              <a:rPr lang="es-ES" smtClean="0"/>
+              <a:rPr lang="es-ES"/>
               <a:t>Segundo nivel</a:t>
             </a:r>
           </a:p>
           <a:p>
             <a:pPr lvl="2"/>
             <a:r>
-              <a:rPr lang="es-ES" smtClean="0"/>
+              <a:rPr lang="es-ES"/>
               <a:t>Tercer nivel</a:t>
             </a:r>
           </a:p>
           <a:p>
             <a:pPr lvl="3"/>
             <a:r>
-              <a:rPr lang="es-ES" smtClean="0"/>
+              <a:rPr lang="es-ES"/>
               <a:t>Cuarto nivel</a:t>
             </a:r>
           </a:p>
           <a:p>
             <a:pPr lvl="4"/>
             <a:r>
-              <a:rPr lang="es-ES" smtClean="0"/>
+              <a:rPr lang="es-ES"/>
               <a:t>Quinto nivel</a:t>
             </a:r>
             <a:endParaRPr lang="en-US" dirty="0"/>
@@ -5529,7 +5612,7 @@
           <a:p>
             <a:fld id="{12DE42F4-6EEF-4EF7-8ED4-2208F0F89A08}" type="datetimeFigureOut">
               <a:rPr lang="en-US" dirty="0"/>
-              <a:t>3/19/2019</a:t>
+              <a:t>9/27/2021</a:t>
             </a:fld>
             <a:endParaRPr lang="en-US" dirty="0"/>
           </a:p>
@@ -5768,7 +5851,7 @@
           </a:lstStyle>
           <a:p>
             <a:r>
-              <a:rPr lang="es-ES" smtClean="0"/>
+              <a:rPr lang="es-ES"/>
               <a:t>Haga clic para modificar el estilo de título del patrón</a:t>
             </a:r>
             <a:endParaRPr lang="en-US" dirty="0"/>
@@ -5890,7 +5973,7 @@
           <a:p>
             <a:pPr lvl="0"/>
             <a:r>
-              <a:rPr lang="es-ES" smtClean="0"/>
+              <a:rPr lang="es-ES"/>
               <a:t>Haga clic para modificar el estilo de texto del patrón</a:t>
             </a:r>
           </a:p>
@@ -5913,7 +5996,7 @@
           <a:p>
             <a:fld id="{30578ACC-22D6-47C1-A373-4FD133E34F3C}" type="datetimeFigureOut">
               <a:rPr lang="en-US" dirty="0"/>
-              <a:t>3/19/2019</a:t>
+              <a:t>9/27/2021</a:t>
             </a:fld>
             <a:endParaRPr lang="en-US" dirty="0"/>
           </a:p>
@@ -6146,7 +6229,7 @@
           <a:lstStyle/>
           <a:p>
             <a:r>
-              <a:rPr lang="es-ES" smtClean="0"/>
+              <a:rPr lang="es-ES"/>
               <a:t>Haga clic para modificar el estilo de título del patrón</a:t>
             </a:r>
             <a:endParaRPr lang="en-US" dirty="0"/>
@@ -6175,35 +6258,35 @@
           <a:p>
             <a:pPr lvl="0"/>
             <a:r>
-              <a:rPr lang="es-ES" smtClean="0"/>
+              <a:rPr lang="es-ES"/>
               <a:t>Haga clic para modificar el estilo de texto del patrón</a:t>
             </a:r>
           </a:p>
           <a:p>
             <a:pPr lvl="1"/>
             <a:r>
-              <a:rPr lang="es-ES" smtClean="0"/>
+              <a:rPr lang="es-ES"/>
               <a:t>Segundo nivel</a:t>
             </a:r>
           </a:p>
           <a:p>
             <a:pPr lvl="2"/>
             <a:r>
-              <a:rPr lang="es-ES" smtClean="0"/>
+              <a:rPr lang="es-ES"/>
               <a:t>Tercer nivel</a:t>
             </a:r>
           </a:p>
           <a:p>
             <a:pPr lvl="3"/>
             <a:r>
-              <a:rPr lang="es-ES" smtClean="0"/>
+              <a:rPr lang="es-ES"/>
               <a:t>Cuarto nivel</a:t>
             </a:r>
           </a:p>
           <a:p>
             <a:pPr lvl="4"/>
             <a:r>
-              <a:rPr lang="es-ES" smtClean="0"/>
+              <a:rPr lang="es-ES"/>
               <a:t>Quinto nivel</a:t>
             </a:r>
             <a:endParaRPr lang="en-US" dirty="0"/>
@@ -6232,35 +6315,35 @@
           <a:p>
             <a:pPr lvl="0"/>
             <a:r>
-              <a:rPr lang="es-ES" smtClean="0"/>
+              <a:rPr lang="es-ES"/>
               <a:t>Haga clic para modificar el estilo de texto del patrón</a:t>
             </a:r>
           </a:p>
           <a:p>
             <a:pPr lvl="1"/>
             <a:r>
-              <a:rPr lang="es-ES" smtClean="0"/>
+              <a:rPr lang="es-ES"/>
               <a:t>Segundo nivel</a:t>
             </a:r>
           </a:p>
           <a:p>
             <a:pPr lvl="2"/>
             <a:r>
-              <a:rPr lang="es-ES" smtClean="0"/>
+              <a:rPr lang="es-ES"/>
               <a:t>Tercer nivel</a:t>
             </a:r>
           </a:p>
           <a:p>
             <a:pPr lvl="3"/>
             <a:r>
-              <a:rPr lang="es-ES" smtClean="0"/>
+              <a:rPr lang="es-ES"/>
               <a:t>Cuarto nivel</a:t>
             </a:r>
           </a:p>
           <a:p>
             <a:pPr lvl="4"/>
             <a:r>
-              <a:rPr lang="es-ES" smtClean="0"/>
+              <a:rPr lang="es-ES"/>
               <a:t>Quinto nivel</a:t>
             </a:r>
             <a:endParaRPr lang="en-US" dirty="0"/>
@@ -6284,7 +6367,7 @@
           <a:p>
             <a:fld id="{4E5A6C69-6797-4E8A-BF37-F2C3751466E9}" type="datetimeFigureOut">
               <a:rPr lang="en-US" dirty="0"/>
-              <a:t>3/19/2019</a:t>
+              <a:t>9/27/2021</a:t>
             </a:fld>
             <a:endParaRPr lang="en-US" dirty="0"/>
           </a:p>
@@ -6517,7 +6600,7 @@
           <a:lstStyle/>
           <a:p>
             <a:r>
-              <a:rPr lang="es-ES" smtClean="0"/>
+              <a:rPr lang="es-ES"/>
               <a:t>Haga clic para modificar el estilo de título del patrón</a:t>
             </a:r>
             <a:endParaRPr lang="en-US" dirty="0"/>
@@ -6583,7 +6666,7 @@
           <a:p>
             <a:pPr lvl="0"/>
             <a:r>
-              <a:rPr lang="es-ES" smtClean="0"/>
+              <a:rPr lang="es-ES"/>
               <a:t>Haga clic para modificar el estilo de texto del patrón</a:t>
             </a:r>
           </a:p>
@@ -6611,35 +6694,35 @@
           <a:p>
             <a:pPr lvl="0"/>
             <a:r>
-              <a:rPr lang="es-ES" smtClean="0"/>
+              <a:rPr lang="es-ES"/>
               <a:t>Haga clic para modificar el estilo de texto del patrón</a:t>
             </a:r>
           </a:p>
           <a:p>
             <a:pPr lvl="1"/>
             <a:r>
-              <a:rPr lang="es-ES" smtClean="0"/>
+              <a:rPr lang="es-ES"/>
               <a:t>Segundo nivel</a:t>
             </a:r>
           </a:p>
           <a:p>
             <a:pPr lvl="2"/>
             <a:r>
-              <a:rPr lang="es-ES" smtClean="0"/>
+              <a:rPr lang="es-ES"/>
               <a:t>Tercer nivel</a:t>
             </a:r>
           </a:p>
           <a:p>
             <a:pPr lvl="3"/>
             <a:r>
-              <a:rPr lang="es-ES" smtClean="0"/>
+              <a:rPr lang="es-ES"/>
               <a:t>Cuarto nivel</a:t>
             </a:r>
           </a:p>
           <a:p>
             <a:pPr lvl="4"/>
             <a:r>
-              <a:rPr lang="es-ES" smtClean="0"/>
+              <a:rPr lang="es-ES"/>
               <a:t>Quinto nivel</a:t>
             </a:r>
             <a:endParaRPr lang="en-US" dirty="0"/>
@@ -6705,7 +6788,7 @@
           <a:p>
             <a:pPr lvl="0"/>
             <a:r>
-              <a:rPr lang="es-ES" smtClean="0"/>
+              <a:rPr lang="es-ES"/>
               <a:t>Haga clic para modificar el estilo de texto del patrón</a:t>
             </a:r>
           </a:p>
@@ -6733,35 +6816,35 @@
           <a:p>
             <a:pPr lvl="0"/>
             <a:r>
-              <a:rPr lang="es-ES" smtClean="0"/>
+              <a:rPr lang="es-ES"/>
               <a:t>Haga clic para modificar el estilo de texto del patrón</a:t>
             </a:r>
           </a:p>
           <a:p>
             <a:pPr lvl="1"/>
             <a:r>
-              <a:rPr lang="es-ES" smtClean="0"/>
+              <a:rPr lang="es-ES"/>
               <a:t>Segundo nivel</a:t>
             </a:r>
           </a:p>
           <a:p>
             <a:pPr lvl="2"/>
             <a:r>
-              <a:rPr lang="es-ES" smtClean="0"/>
+              <a:rPr lang="es-ES"/>
               <a:t>Tercer nivel</a:t>
             </a:r>
           </a:p>
           <a:p>
             <a:pPr lvl="3"/>
             <a:r>
-              <a:rPr lang="es-ES" smtClean="0"/>
+              <a:rPr lang="es-ES"/>
               <a:t>Cuarto nivel</a:t>
             </a:r>
           </a:p>
           <a:p>
             <a:pPr lvl="4"/>
             <a:r>
-              <a:rPr lang="es-ES" smtClean="0"/>
+              <a:rPr lang="es-ES"/>
               <a:t>Quinto nivel</a:t>
             </a:r>
             <a:endParaRPr lang="en-US" dirty="0"/>
@@ -6785,7 +6868,7 @@
           <a:p>
             <a:fld id="{D82014A1-A632-4878-A0D3-F52BA7563730}" type="datetimeFigureOut">
               <a:rPr lang="en-US" dirty="0"/>
-              <a:t>3/19/2019</a:t>
+              <a:t>9/27/2021</a:t>
             </a:fld>
             <a:endParaRPr lang="en-US" dirty="0"/>
           </a:p>
@@ -7013,7 +7096,7 @@
           <a:lstStyle/>
           <a:p>
             <a:r>
-              <a:rPr lang="es-ES" smtClean="0"/>
+              <a:rPr lang="es-ES"/>
               <a:t>Haga clic para modificar el estilo de título del patrón</a:t>
             </a:r>
             <a:endParaRPr lang="en-US" dirty="0"/>
@@ -7037,7 +7120,7 @@
           <a:p>
             <a:fld id="{CE99F462-093F-4566-844B-4C71F2739DA5}" type="datetimeFigureOut">
               <a:rPr lang="en-US" dirty="0"/>
-              <a:t>3/19/2019</a:t>
+              <a:t>9/27/2021</a:t>
             </a:fld>
             <a:endParaRPr lang="en-US" dirty="0"/>
           </a:p>
@@ -7195,7 +7278,7 @@
           <a:p>
             <a:fld id="{3D24A7AC-904D-4781-85BA-7D10C17ED021}" type="datetimeFigureOut">
               <a:rPr lang="en-US" dirty="0"/>
-              <a:t>3/19/2019</a:t>
+              <a:t>9/27/2021</a:t>
             </a:fld>
             <a:endParaRPr lang="en-US" dirty="0"/>
           </a:p>
@@ -7434,7 +7517,7 @@
           </a:lstStyle>
           <a:p>
             <a:r>
-              <a:rPr lang="es-ES" smtClean="0"/>
+              <a:rPr lang="es-ES"/>
               <a:t>Haga clic para modificar el estilo de título del patrón</a:t>
             </a:r>
             <a:endParaRPr lang="en-US" dirty="0"/>
@@ -7463,35 +7546,35 @@
           <a:p>
             <a:pPr lvl="0"/>
             <a:r>
-              <a:rPr lang="es-ES" smtClean="0"/>
+              <a:rPr lang="es-ES"/>
               <a:t>Haga clic para modificar el estilo de texto del patrón</a:t>
             </a:r>
           </a:p>
           <a:p>
             <a:pPr lvl="1"/>
             <a:r>
-              <a:rPr lang="es-ES" smtClean="0"/>
+              <a:rPr lang="es-ES"/>
               <a:t>Segundo nivel</a:t>
             </a:r>
           </a:p>
           <a:p>
             <a:pPr lvl="2"/>
             <a:r>
-              <a:rPr lang="es-ES" smtClean="0"/>
+              <a:rPr lang="es-ES"/>
               <a:t>Tercer nivel</a:t>
             </a:r>
           </a:p>
           <a:p>
             <a:pPr lvl="3"/>
             <a:r>
-              <a:rPr lang="es-ES" smtClean="0"/>
+              <a:rPr lang="es-ES"/>
               <a:t>Cuarto nivel</a:t>
             </a:r>
           </a:p>
           <a:p>
             <a:pPr lvl="4"/>
             <a:r>
-              <a:rPr lang="es-ES" smtClean="0"/>
+              <a:rPr lang="es-ES"/>
               <a:t>Quinto nivel</a:t>
             </a:r>
             <a:endParaRPr lang="en-US" dirty="0"/>
@@ -7557,7 +7640,7 @@
           <a:p>
             <a:pPr lvl="0"/>
             <a:r>
-              <a:rPr lang="es-ES" smtClean="0"/>
+              <a:rPr lang="es-ES"/>
               <a:t>Haga clic para modificar el estilo de texto del patrón</a:t>
             </a:r>
           </a:p>
@@ -7580,7 +7663,7 @@
           <a:p>
             <a:fld id="{E331444B-B92B-4E27-8C94-BB93EAF5CB18}" type="datetimeFigureOut">
               <a:rPr lang="en-US" dirty="0"/>
-              <a:t>3/19/2019</a:t>
+              <a:t>9/27/2021</a:t>
             </a:fld>
             <a:endParaRPr lang="en-US" dirty="0"/>
           </a:p>
@@ -7819,7 +7902,7 @@
           </a:lstStyle>
           <a:p>
             <a:r>
-              <a:rPr lang="es-ES" smtClean="0"/>
+              <a:rPr lang="es-ES"/>
               <a:t>Haga clic para modificar el estilo de título del patrón</a:t>
             </a:r>
             <a:endParaRPr lang="en-US" dirty="0"/>
@@ -7895,7 +7978,7 @@
           </a:lstStyle>
           <a:p>
             <a:r>
-              <a:rPr lang="es-ES" smtClean="0"/>
+              <a:rPr lang="es-ES"/>
               <a:t>Haga clic en el icono para agregar una imagen</a:t>
             </a:r>
             <a:endParaRPr lang="en-US" dirty="0"/>
@@ -7961,7 +8044,7 @@
           <a:p>
             <a:pPr lvl="0"/>
             <a:r>
-              <a:rPr lang="es-ES" smtClean="0"/>
+              <a:rPr lang="es-ES"/>
               <a:t>Haga clic para modificar el estilo de texto del patrón</a:t>
             </a:r>
           </a:p>
@@ -7984,7 +8067,7 @@
           <a:p>
             <a:fld id="{363EFA5E-FA76-400D-B3DC-F0BA90E6D107}" type="datetimeFigureOut">
               <a:rPr lang="en-US" dirty="0"/>
-              <a:t>3/19/2019</a:t>
+              <a:t>9/27/2021</a:t>
             </a:fld>
             <a:endParaRPr lang="en-US" dirty="0"/>
           </a:p>
@@ -8119,7 +8202,7 @@
           <a:lstStyle/>
           <a:p>
             <a:r>
-              <a:rPr lang="es-ES" smtClean="0"/>
+              <a:rPr lang="es-ES"/>
               <a:t>Haga clic para modificar el estilo de título del patrón</a:t>
             </a:r>
             <a:endParaRPr lang="en-US" dirty="0"/>
@@ -8153,35 +8236,35 @@
           <a:p>
             <a:pPr lvl="0"/>
             <a:r>
-              <a:rPr lang="es-ES" smtClean="0"/>
+              <a:rPr lang="es-ES"/>
               <a:t>Haga clic para modificar el estilo de texto del patrón</a:t>
             </a:r>
           </a:p>
           <a:p>
             <a:pPr lvl="1"/>
             <a:r>
-              <a:rPr lang="es-ES" smtClean="0"/>
+              <a:rPr lang="es-ES"/>
               <a:t>Segundo nivel</a:t>
             </a:r>
           </a:p>
           <a:p>
             <a:pPr lvl="2"/>
             <a:r>
-              <a:rPr lang="es-ES" smtClean="0"/>
+              <a:rPr lang="es-ES"/>
               <a:t>Tercer nivel</a:t>
             </a:r>
           </a:p>
           <a:p>
             <a:pPr lvl="3"/>
             <a:r>
-              <a:rPr lang="es-ES" smtClean="0"/>
+              <a:rPr lang="es-ES"/>
               <a:t>Cuarto nivel</a:t>
             </a:r>
           </a:p>
           <a:p>
             <a:pPr lvl="4"/>
             <a:r>
-              <a:rPr lang="es-ES" smtClean="0"/>
+              <a:rPr lang="es-ES"/>
               <a:t>Quinto nivel</a:t>
             </a:r>
             <a:endParaRPr lang="en-US" dirty="0"/>
@@ -8223,7 +8306,7 @@
           <a:p>
             <a:fld id="{9D6E9DEC-419B-4CC5-A080-3B06BD5A8291}" type="datetimeFigureOut">
               <a:rPr lang="en-US" dirty="0"/>
-              <a:t>3/19/2019</a:t>
+              <a:t>9/27/2021</a:t>
             </a:fld>
             <a:endParaRPr lang="en-US" dirty="0"/>
           </a:p>
@@ -8647,10 +8730,9 @@
           <a:lstStyle/>
           <a:p>
             <a:r>
-              <a:rPr lang="es-AR" dirty="0" smtClean="0"/>
+              <a:rPr lang="es-AR" dirty="0"/>
               <a:t>Programación Orientada a Objetos</a:t>
             </a:r>
-            <a:endParaRPr lang="es-AR" dirty="0"/>
           </a:p>
         </p:txBody>
       </p:sp>
@@ -8725,11 +8807,7 @@
             </a:pPr>
             <a:r>
               <a:rPr lang="es-AR" dirty="0"/>
-              <a:t>Edición </a:t>
-            </a:r>
-            <a:r>
-              <a:rPr lang="es-AR" dirty="0" smtClean="0"/>
-              <a:t>2018</a:t>
+              <a:t>Edición 2018</a:t>
             </a:r>
             <a:endParaRPr lang="es-AR" dirty="0">
               <a:solidFill>
@@ -8789,7 +8867,7 @@
               <a:buNone/>
             </a:pPr>
             <a:r>
-              <a:rPr lang="es-AR" dirty="0" smtClean="0">
+              <a:rPr lang="es-AR" dirty="0">
                 <a:solidFill>
                   <a:prstClr val="white"/>
                 </a:solidFill>
@@ -8797,12 +8875,6 @@
               </a:rPr>
               <a:t>2</a:t>
             </a:r>
-            <a:endParaRPr lang="es-AR" dirty="0">
-              <a:solidFill>
-                <a:prstClr val="white"/>
-              </a:solidFill>
-              <a:latin typeface="Trebuchet MS" panose="020B0603020202020204"/>
-            </a:endParaRPr>
           </a:p>
         </p:txBody>
       </p:sp>
@@ -8846,16 +8918,20 @@
             <p:ph type="title"/>
           </p:nvPr>
         </p:nvSpPr>
-        <p:spPr/>
+        <p:spPr>
+          <a:xfrm>
+            <a:off x="680321" y="637725"/>
+            <a:ext cx="9613861" cy="1080938"/>
+          </a:xfrm>
+        </p:spPr>
         <p:txBody>
           <a:bodyPr/>
           <a:lstStyle/>
           <a:p>
             <a:r>
-              <a:rPr lang="es-AR" dirty="0" smtClean="0"/>
+              <a:rPr lang="es-AR" dirty="0"/>
               <a:t>Modificadores Clases</a:t>
             </a:r>
-            <a:endParaRPr lang="es-AR" dirty="0"/>
           </a:p>
         </p:txBody>
       </p:sp>
@@ -8868,14 +8944,14 @@
           <p:nvPr>
             <p:extLst>
               <p:ext uri="{D42A27DB-BD31-4B8C-83A1-F6EECF244321}">
-                <p14:modId xmlns:p14="http://schemas.microsoft.com/office/powerpoint/2010/main" val="1323572792"/>
+                <p14:modId xmlns:p14="http://schemas.microsoft.com/office/powerpoint/2010/main" val="180387936"/>
               </p:ext>
             </p:extLst>
           </p:nvPr>
         </p:nvGraphicFramePr>
         <p:xfrm>
           <a:off x="377370" y="2098523"/>
-          <a:ext cx="11263086" cy="3935472"/>
+          <a:ext cx="11263086" cy="4703568"/>
         </p:xfrm>
         <a:graphic>
           <a:graphicData uri="http://schemas.openxmlformats.org/drawingml/2006/table">
@@ -8884,8 +8960,20 @@
                 <a:tableStyleId>{5C22544A-7EE6-4342-B048-85BDC9FD1C3A}</a:tableStyleId>
               </a:tblPr>
               <a:tblGrid>
-                <a:gridCol w="5631543"/>
-                <a:gridCol w="5631543"/>
+                <a:gridCol w="5631543">
+                  <a:extLst>
+                    <a:ext uri="{9D8B030D-6E8A-4147-A177-3AD203B41FA5}">
+                      <a16:colId xmlns:a16="http://schemas.microsoft.com/office/drawing/2014/main" val="20000"/>
+                    </a:ext>
+                  </a:extLst>
+                </a:gridCol>
+                <a:gridCol w="5631543">
+                  <a:extLst>
+                    <a:ext uri="{9D8B030D-6E8A-4147-A177-3AD203B41FA5}">
+                      <a16:colId xmlns:a16="http://schemas.microsoft.com/office/drawing/2014/main" val="20001"/>
+                    </a:ext>
+                  </a:extLst>
+                </a:gridCol>
               </a:tblGrid>
               <a:tr h="370840">
                 <a:tc>
@@ -8912,7 +9000,7 @@
                         <a:tabLst/>
                       </a:pPr>
                       <a:r>
-                        <a:rPr kumimoji="0" lang="es-ES" sz="2200" b="0" i="0" u="none" strike="noStrike" cap="none" normalizeH="0" baseline="0" dirty="0" smtClean="0">
+                        <a:rPr kumimoji="0" lang="es-ES" sz="2200" b="0" i="0" u="none" strike="noStrike" cap="none" normalizeH="0" baseline="0" dirty="0">
                           <a:ln>
                             <a:noFill/>
                           </a:ln>
@@ -8952,7 +9040,7 @@
                         <a:tabLst/>
                       </a:pPr>
                       <a:r>
-                        <a:rPr kumimoji="0" lang="es-ES" sz="2200" b="0" i="0" u="none" strike="noStrike" cap="none" normalizeH="0" baseline="0" dirty="0" smtClean="0">
+                        <a:rPr kumimoji="0" lang="es-ES" sz="2200" b="0" i="0" u="none" strike="noStrike" cap="none" normalizeH="0" baseline="0" dirty="0">
                           <a:ln>
                             <a:noFill/>
                           </a:ln>
@@ -8968,6 +9056,11 @@
                   </a:txBody>
                   <a:tcPr marL="90000" marR="90000" marT="46778" marB="46778" horzOverflow="overflow"/>
                 </a:tc>
+                <a:extLst>
+                  <a:ext uri="{0D108BD9-81ED-4DB2-BD59-A6C34878D82A}">
+                    <a16:rowId xmlns:a16="http://schemas.microsoft.com/office/drawing/2014/main" val="10000"/>
+                  </a:ext>
+                </a:extLst>
               </a:tr>
               <a:tr h="370840">
                 <a:tc>
@@ -8994,7 +9087,7 @@
                         <a:tabLst/>
                       </a:pPr>
                       <a:r>
-                        <a:rPr kumimoji="0" lang="es-ES" sz="2800" b="0" i="0" u="none" strike="noStrike" cap="none" normalizeH="0" baseline="0" dirty="0" smtClean="0">
+                        <a:rPr kumimoji="0" lang="es-ES" sz="2800" b="0" i="0" u="none" strike="noStrike" cap="none" normalizeH="0" baseline="0" dirty="0">
                           <a:ln>
                             <a:noFill/>
                           </a:ln>
@@ -9034,7 +9127,7 @@
                         <a:tabLst/>
                       </a:pPr>
                       <a:r>
-                        <a:rPr kumimoji="0" lang="es-ES" sz="2800" b="0" i="0" u="none" strike="noStrike" cap="none" normalizeH="0" baseline="0" dirty="0" smtClean="0">
+                        <a:rPr kumimoji="0" lang="es-ES" sz="2800" b="0" i="0" u="none" strike="noStrike" cap="none" normalizeH="0" baseline="0" dirty="0">
                           <a:ln>
                             <a:noFill/>
                           </a:ln>
@@ -9050,6 +9143,11 @@
                   </a:txBody>
                   <a:tcPr marL="90000" marR="90000" marT="46778" marB="46778" horzOverflow="overflow"/>
                 </a:tc>
+                <a:extLst>
+                  <a:ext uri="{0D108BD9-81ED-4DB2-BD59-A6C34878D82A}">
+                    <a16:rowId xmlns:a16="http://schemas.microsoft.com/office/drawing/2014/main" val="10001"/>
+                  </a:ext>
+                </a:extLst>
               </a:tr>
               <a:tr h="370840">
                 <a:tc>
@@ -9076,7 +9174,7 @@
                         <a:tabLst/>
                       </a:pPr>
                       <a:r>
-                        <a:rPr kumimoji="0" lang="es-ES" sz="2800" b="0" i="0" u="none" strike="noStrike" cap="none" normalizeH="0" baseline="0" dirty="0" smtClean="0">
+                        <a:rPr kumimoji="0" lang="es-ES" sz="2800" b="0" i="0" u="none" strike="noStrike" cap="none" normalizeH="0" baseline="0" dirty="0">
                           <a:ln>
                             <a:noFill/>
                           </a:ln>
@@ -9116,7 +9214,7 @@
                         <a:tabLst/>
                       </a:pPr>
                       <a:r>
-                        <a:rPr kumimoji="0" lang="es-ES" sz="2800" b="0" i="0" u="none" strike="noStrike" cap="none" normalizeH="0" baseline="0" dirty="0" smtClean="0">
+                        <a:rPr kumimoji="0" lang="es-ES" sz="2800" b="0" i="0" u="none" strike="noStrike" cap="none" normalizeH="0" baseline="0" dirty="0">
                           <a:ln>
                             <a:noFill/>
                           </a:ln>
@@ -9126,12 +9224,69 @@
                           <a:effectLst/>
                           <a:latin typeface="Franklin Gothic Medium" pitchFamily="34" charset="0"/>
                         </a:rPr>
-                        <a:t>Accesible en todo el proyecto (Assembly).</a:t>
+                        <a:t>Accesible en todo el proyecto (</a:t>
+                      </a:r>
+                      <a:r>
+                        <a:rPr kumimoji="0" lang="es-ES" sz="2800" b="0" i="0" u="none" strike="noStrike" cap="none" normalizeH="0" baseline="0" dirty="0" err="1">
+                          <a:ln>
+                            <a:noFill/>
+                          </a:ln>
+                          <a:solidFill>
+                            <a:srgbClr val="9D360E"/>
+                          </a:solidFill>
+                          <a:effectLst/>
+                          <a:latin typeface="Franklin Gothic Medium" pitchFamily="34" charset="0"/>
+                        </a:rPr>
+                        <a:t>Assembly</a:t>
+                      </a:r>
+                      <a:r>
+                        <a:rPr kumimoji="0" lang="es-ES" sz="2800" b="0" i="0" u="none" strike="noStrike" cap="none" normalizeH="0" baseline="0" dirty="0">
+                          <a:ln>
+                            <a:noFill/>
+                          </a:ln>
+                          <a:solidFill>
+                            <a:srgbClr val="9D360E"/>
+                          </a:solidFill>
+                          <a:effectLst/>
+                          <a:latin typeface="Franklin Gothic Medium" pitchFamily="34" charset="0"/>
+                        </a:rPr>
+                        <a:t>). </a:t>
+                      </a:r>
+                      <a:r>
+                        <a:rPr kumimoji="0" lang="es-ES" sz="2800" b="0" i="0" u="none" strike="noStrike" cap="none" normalizeH="0" baseline="0" dirty="0" err="1">
+                          <a:ln>
+                            <a:noFill/>
+                          </a:ln>
+                          <a:solidFill>
+                            <a:srgbClr val="9D360E"/>
+                          </a:solidFill>
+                          <a:effectLst/>
+                          <a:latin typeface="Franklin Gothic Medium" pitchFamily="34" charset="0"/>
+                        </a:rPr>
+                        <a:t>Accesor</a:t>
+                      </a:r>
+                      <a:r>
+                        <a:rPr kumimoji="0" lang="es-ES" sz="2800" b="0" i="0" u="none" strike="noStrike" cap="none" normalizeH="0" baseline="0" dirty="0">
+                          <a:ln>
+                            <a:noFill/>
+                          </a:ln>
+                          <a:solidFill>
+                            <a:srgbClr val="9D360E"/>
+                          </a:solidFill>
+                          <a:effectLst/>
+                          <a:latin typeface="Franklin Gothic Medium" pitchFamily="34" charset="0"/>
+                        </a:rPr>
+                        <a:t> por defecto</a:t>
                       </a:r>
                     </a:p>
                   </a:txBody>
                   <a:tcPr marL="90000" marR="90000" marT="46778" marB="46778" horzOverflow="overflow"/>
                 </a:tc>
+                <a:extLst>
+                  <a:ext uri="{0D108BD9-81ED-4DB2-BD59-A6C34878D82A}">
+                    <a16:rowId xmlns:a16="http://schemas.microsoft.com/office/drawing/2014/main" val="10002"/>
+                  </a:ext>
+                </a:extLst>
               </a:tr>
               <a:tr h="370840">
                 <a:tc>
@@ -9158,7 +9313,7 @@
                         <a:tabLst/>
                       </a:pPr>
                       <a:r>
-                        <a:rPr kumimoji="0" lang="es-ES" sz="2800" b="0" i="0" u="none" strike="noStrike" cap="none" normalizeH="0" baseline="0" dirty="0" smtClean="0">
+                        <a:rPr kumimoji="0" lang="es-ES" sz="2800" b="0" i="0" u="none" strike="noStrike" cap="none" normalizeH="0" baseline="0" dirty="0">
                           <a:ln>
                             <a:noFill/>
                           </a:ln>
@@ -9198,7 +9353,7 @@
                         <a:tabLst/>
                       </a:pPr>
                       <a:r>
-                        <a:rPr kumimoji="0" lang="es-ES" sz="2800" b="0" i="0" u="none" strike="noStrike" cap="none" normalizeH="0" baseline="0" dirty="0" smtClean="0">
+                        <a:rPr kumimoji="0" lang="es-ES" sz="2800" b="0" i="0" u="none" strike="noStrike" cap="none" normalizeH="0" baseline="0" dirty="0">
                           <a:ln>
                             <a:noFill/>
                           </a:ln>
@@ -9214,6 +9369,11 @@
                   </a:txBody>
                   <a:tcPr marL="90000" marR="90000" marT="46778" marB="46778" horzOverflow="overflow"/>
                 </a:tc>
+                <a:extLst>
+                  <a:ext uri="{0D108BD9-81ED-4DB2-BD59-A6C34878D82A}">
+                    <a16:rowId xmlns:a16="http://schemas.microsoft.com/office/drawing/2014/main" val="10003"/>
+                  </a:ext>
+                </a:extLst>
               </a:tr>
               <a:tr h="370840">
                 <a:tc>
@@ -9240,7 +9400,7 @@
                         <a:tabLst/>
                       </a:pPr>
                       <a:r>
-                        <a:rPr kumimoji="0" lang="es-ES" sz="2800" b="0" i="0" u="none" strike="noStrike" cap="none" normalizeH="0" baseline="0" dirty="0" smtClean="0">
+                        <a:rPr kumimoji="0" lang="es-ES" sz="2800" b="0" i="0" u="none" strike="noStrike" cap="none" normalizeH="0" baseline="0" dirty="0">
                           <a:ln>
                             <a:noFill/>
                           </a:ln>
@@ -9280,7 +9440,7 @@
                         <a:tabLst/>
                       </a:pPr>
                       <a:r>
-                        <a:rPr kumimoji="0" lang="es-ES" sz="2800" b="0" i="0" u="none" strike="noStrike" cap="none" normalizeH="0" baseline="0" dirty="0" smtClean="0">
+                        <a:rPr kumimoji="0" lang="es-ES" sz="2800" b="0" i="0" u="none" strike="noStrike" cap="none" normalizeH="0" baseline="0" dirty="0">
                           <a:ln>
                             <a:noFill/>
                           </a:ln>
@@ -9290,12 +9450,95 @@
                           <a:effectLst/>
                           <a:latin typeface="Franklin Gothic Medium" pitchFamily="34" charset="0"/>
                         </a:rPr>
-                        <a:t>Accesor por defecto.</a:t>
+                        <a:t>Solo es posible declarar </a:t>
+                      </a:r>
+                      <a:r>
+                        <a:rPr kumimoji="0" lang="es-ES" sz="2800" b="0" i="0" u="none" strike="noStrike" cap="none" normalizeH="0" baseline="0" dirty="0" err="1">
+                          <a:ln>
+                            <a:noFill/>
+                          </a:ln>
+                          <a:solidFill>
+                            <a:srgbClr val="9D360E"/>
+                          </a:solidFill>
+                          <a:effectLst/>
+                          <a:latin typeface="Franklin Gothic Medium" pitchFamily="34" charset="0"/>
+                        </a:rPr>
+                        <a:t>private</a:t>
+                      </a:r>
+                      <a:r>
+                        <a:rPr kumimoji="0" lang="es-ES" sz="2800" b="0" i="0" u="none" strike="noStrike" cap="none" normalizeH="0" baseline="0" dirty="0">
+                          <a:ln>
+                            <a:noFill/>
+                          </a:ln>
+                          <a:solidFill>
+                            <a:srgbClr val="9D360E"/>
+                          </a:solidFill>
+                          <a:effectLst/>
+                          <a:latin typeface="Franklin Gothic Medium" pitchFamily="34" charset="0"/>
+                        </a:rPr>
+                        <a:t> si se encuentra dentro de otra clase. (</a:t>
+                      </a:r>
+                      <a:r>
+                        <a:rPr kumimoji="0" lang="es-ES" sz="2800" b="0" i="0" u="none" strike="noStrike" cap="none" normalizeH="0" baseline="0" dirty="0" err="1">
+                          <a:ln>
+                            <a:noFill/>
+                          </a:ln>
+                          <a:solidFill>
+                            <a:srgbClr val="9D360E"/>
+                          </a:solidFill>
+                          <a:effectLst/>
+                          <a:latin typeface="Franklin Gothic Medium" pitchFamily="34" charset="0"/>
+                        </a:rPr>
+                        <a:t>nested</a:t>
+                      </a:r>
+                      <a:r>
+                        <a:rPr kumimoji="0" lang="es-ES" sz="2800" b="0" i="0" u="none" strike="noStrike" cap="none" normalizeH="0" baseline="0" dirty="0">
+                          <a:ln>
+                            <a:noFill/>
+                          </a:ln>
+                          <a:solidFill>
+                            <a:srgbClr val="9D360E"/>
+                          </a:solidFill>
+                          <a:effectLst/>
+                          <a:latin typeface="Franklin Gothic Medium" pitchFamily="34" charset="0"/>
+                        </a:rPr>
+                        <a:t> </a:t>
+                      </a:r>
+                      <a:r>
+                        <a:rPr kumimoji="0" lang="es-ES" sz="2800" b="0" i="0" u="none" strike="noStrike" cap="none" normalizeH="0" baseline="0" dirty="0" err="1">
+                          <a:ln>
+                            <a:noFill/>
+                          </a:ln>
+                          <a:solidFill>
+                            <a:srgbClr val="9D360E"/>
+                          </a:solidFill>
+                          <a:effectLst/>
+                          <a:latin typeface="Franklin Gothic Medium" pitchFamily="34" charset="0"/>
+                        </a:rPr>
+                        <a:t>class</a:t>
+                      </a:r>
+                      <a:r>
+                        <a:rPr kumimoji="0" lang="es-ES" sz="2800" b="0" i="0" u="none" strike="noStrike" cap="none" normalizeH="0" baseline="0" dirty="0">
+                          <a:ln>
+                            <a:noFill/>
+                          </a:ln>
+                          <a:solidFill>
+                            <a:srgbClr val="9D360E"/>
+                          </a:solidFill>
+                          <a:effectLst/>
+                          <a:latin typeface="Franklin Gothic Medium" pitchFamily="34" charset="0"/>
+                        </a:rPr>
+                        <a:t>)</a:t>
                       </a:r>
                     </a:p>
                   </a:txBody>
                   <a:tcPr marL="90000" marR="90000" marT="46778" marB="46778" horzOverflow="overflow"/>
                 </a:tc>
+                <a:extLst>
+                  <a:ext uri="{0D108BD9-81ED-4DB2-BD59-A6C34878D82A}">
+                    <a16:rowId xmlns:a16="http://schemas.microsoft.com/office/drawing/2014/main" val="10004"/>
+                  </a:ext>
+                </a:extLst>
               </a:tr>
               <a:tr h="370840">
                 <a:tc>
@@ -9322,7 +9565,7 @@
                         <a:tabLst/>
                       </a:pPr>
                       <a:r>
-                        <a:rPr kumimoji="0" lang="es-ES" sz="2800" b="0" i="0" u="none" strike="noStrike" cap="none" normalizeH="0" baseline="0" dirty="0" smtClean="0">
+                        <a:rPr kumimoji="0" lang="es-ES" sz="2800" b="0" i="0" u="none" strike="noStrike" cap="none" normalizeH="0" baseline="0" dirty="0">
                           <a:ln>
                             <a:noFill/>
                           </a:ln>
@@ -9362,7 +9605,7 @@
                         <a:tabLst/>
                       </a:pPr>
                       <a:r>
-                        <a:rPr kumimoji="0" lang="es-ES" sz="2800" b="0" i="0" u="none" strike="noStrike" cap="none" normalizeH="0" baseline="0" dirty="0" smtClean="0">
+                        <a:rPr kumimoji="0" lang="es-ES" sz="2800" b="0" i="0" u="none" strike="noStrike" cap="none" normalizeH="0" baseline="0" dirty="0">
                           <a:ln>
                             <a:noFill/>
                           </a:ln>
@@ -9378,6 +9621,11 @@
                   </a:txBody>
                   <a:tcPr marL="90000" marR="90000" marT="46778" marB="46778" horzOverflow="overflow"/>
                 </a:tc>
+                <a:extLst>
+                  <a:ext uri="{0D108BD9-81ED-4DB2-BD59-A6C34878D82A}">
+                    <a16:rowId xmlns:a16="http://schemas.microsoft.com/office/drawing/2014/main" val="10005"/>
+                  </a:ext>
+                </a:extLst>
               </a:tr>
             </a:tbl>
           </a:graphicData>
@@ -9391,7 +9639,7 @@
         </p:nvSpPr>
         <p:spPr>
           <a:xfrm>
-            <a:off x="680321" y="6226628"/>
+            <a:off x="377370" y="6432759"/>
             <a:ext cx="3370090" cy="369332"/>
           </a:xfrm>
           <a:prstGeom prst="rect">
@@ -9414,27 +9662,8 @@
                 </a:effectLst>
                 <a:latin typeface="Franklin Gothic Medium" pitchFamily="34" charset="0"/>
               </a:rPr>
-              <a:t>(*): Modificadores de visibilidad</a:t>
-            </a:r>
-            <a:r>
-              <a:rPr lang="es-ES" dirty="0" smtClean="0">
-                <a:effectLst>
-                  <a:outerShdw blurRad="38100" dist="38100" dir="2700000" algn="tl">
-                    <a:srgbClr val="000000"/>
-                  </a:outerShdw>
-                </a:effectLst>
-                <a:latin typeface="Franklin Gothic Medium" pitchFamily="34" charset="0"/>
-              </a:rPr>
-              <a:t>.</a:t>
-            </a:r>
-            <a:endParaRPr lang="es-ES" dirty="0">
-              <a:effectLst>
-                <a:outerShdw blurRad="38100" dist="38100" dir="2700000" algn="tl">
-                  <a:srgbClr val="000000"/>
-                </a:outerShdw>
-              </a:effectLst>
-              <a:latin typeface="Franklin Gothic Medium" pitchFamily="34" charset="0"/>
-            </a:endParaRPr>
+              <a:t>(*): Modificadores de visibilidad.</a:t>
+            </a:r>
           </a:p>
         </p:txBody>
       </p:sp>
@@ -9448,13 +9677,6 @@
   <p:clrMapOvr>
     <a:masterClrMapping/>
   </p:clrMapOvr>
-  <p:timing>
-    <p:tnLst>
-      <p:par>
-        <p:cTn id="1" dur="indefinite" restart="never" nodeType="tmRoot"/>
-      </p:par>
-    </p:tnLst>
-  </p:timing>
 </p:sld>
 </file>
 
@@ -9491,10 +9713,9 @@
           <a:lstStyle/>
           <a:p>
             <a:r>
-              <a:rPr lang="es-AR" dirty="0" smtClean="0"/>
+              <a:rPr lang="es-AR" dirty="0"/>
               <a:t>Atributos</a:t>
             </a:r>
-            <a:endParaRPr lang="es-AR" dirty="0"/>
           </a:p>
         </p:txBody>
       </p:sp>
@@ -9837,7 +10058,7 @@
               <a:t>miNombre</a:t>
             </a:r>
             <a:r>
-              <a:rPr lang="es-ES" sz="2400" dirty="0" smtClean="0">
+              <a:rPr lang="es-ES" sz="2400" dirty="0">
                 <a:effectLst>
                   <a:outerShdw blurRad="38100" dist="38100" dir="2700000" algn="tl">
                     <a:srgbClr val="000000">
@@ -9849,16 +10070,6 @@
               </a:rPr>
               <a:t>;</a:t>
             </a:r>
-            <a:endParaRPr lang="es-ES" sz="2400" dirty="0">
-              <a:effectLst>
-                <a:outerShdw blurRad="38100" dist="38100" dir="2700000" algn="tl">
-                  <a:srgbClr val="000000">
-                    <a:alpha val="43137"/>
-                  </a:srgbClr>
-                </a:outerShdw>
-              </a:effectLst>
-              <a:latin typeface="Franklin Gothic Medium" panose="020B0603020102020204" pitchFamily="34" charset="0"/>
-            </a:endParaRPr>
           </a:p>
         </p:txBody>
       </p:sp>
@@ -10162,7 +10373,7 @@
               <a:t>[modificador] </a:t>
             </a:r>
             <a:r>
-              <a:rPr lang="es-AR" altLang="es-AR" sz="2000" b="1" smtClean="0">
+              <a:rPr lang="es-AR" altLang="es-AR" sz="2000" b="1">
                 <a:solidFill>
                   <a:srgbClr val="0000FF"/>
                 </a:solidFill>
@@ -10182,7 +10393,7 @@
               <a:t>identificador</a:t>
             </a:r>
             <a:r>
-              <a:rPr lang="es-AR" altLang="es-AR" sz="2000" b="1" dirty="0" smtClean="0">
+              <a:rPr lang="es-AR" altLang="es-AR" sz="2000" b="1" dirty="0">
                 <a:solidFill>
                   <a:srgbClr val="000000"/>
                 </a:solidFill>
@@ -10191,13 +10402,6 @@
               </a:rPr>
               <a:t>;</a:t>
             </a:r>
-            <a:endParaRPr lang="es-AR" altLang="es-AR" sz="2000" b="1" dirty="0">
-              <a:solidFill>
-                <a:srgbClr val="000000"/>
-              </a:solidFill>
-              <a:latin typeface="Arial Narrow" panose="020B0606020202030204" pitchFamily="34" charset="0"/>
-              <a:cs typeface="Times New Roman" panose="02020603050405020304" pitchFamily="18" charset="0"/>
-            </a:endParaRPr>
           </a:p>
         </p:txBody>
       </p:sp>
@@ -10211,13 +10415,6 @@
   <p:clrMapOvr>
     <a:masterClrMapping/>
   </p:clrMapOvr>
-  <p:timing>
-    <p:tnLst>
-      <p:par>
-        <p:cTn id="1" dur="indefinite" restart="never" nodeType="tmRoot"/>
-      </p:par>
-    </p:tnLst>
-  </p:timing>
 </p:sld>
 </file>
 
@@ -10254,10 +10451,9 @@
           <a:lstStyle/>
           <a:p>
             <a:r>
-              <a:rPr lang="es-AR" dirty="0" smtClean="0"/>
+              <a:rPr lang="es-AR" dirty="0"/>
               <a:t>Modificadores Atributos</a:t>
             </a:r>
-            <a:endParaRPr lang="es-AR" dirty="0"/>
           </a:p>
         </p:txBody>
       </p:sp>
@@ -10286,8 +10482,20 @@
                 <a:tableStyleId>{5C22544A-7EE6-4342-B048-85BDC9FD1C3A}</a:tableStyleId>
               </a:tblPr>
               <a:tblGrid>
-                <a:gridCol w="5631543"/>
-                <a:gridCol w="5631543"/>
+                <a:gridCol w="5631543">
+                  <a:extLst>
+                    <a:ext uri="{9D8B030D-6E8A-4147-A177-3AD203B41FA5}">
+                      <a16:colId xmlns:a16="http://schemas.microsoft.com/office/drawing/2014/main" val="20000"/>
+                    </a:ext>
+                  </a:extLst>
+                </a:gridCol>
+                <a:gridCol w="5631543">
+                  <a:extLst>
+                    <a:ext uri="{9D8B030D-6E8A-4147-A177-3AD203B41FA5}">
+                      <a16:colId xmlns:a16="http://schemas.microsoft.com/office/drawing/2014/main" val="20001"/>
+                    </a:ext>
+                  </a:extLst>
+                </a:gridCol>
               </a:tblGrid>
               <a:tr h="370840">
                 <a:tc>
@@ -10314,7 +10522,7 @@
                         <a:tabLst/>
                       </a:pPr>
                       <a:r>
-                        <a:rPr kumimoji="0" lang="es-ES" sz="2200" b="0" i="0" u="none" strike="noStrike" cap="none" normalizeH="0" baseline="0" dirty="0" smtClean="0">
+                        <a:rPr kumimoji="0" lang="es-ES" sz="2200" b="0" i="0" u="none" strike="noStrike" cap="none" normalizeH="0" baseline="0" dirty="0">
                           <a:ln>
                             <a:noFill/>
                           </a:ln>
@@ -10354,7 +10562,7 @@
                         <a:tabLst/>
                       </a:pPr>
                       <a:r>
-                        <a:rPr kumimoji="0" lang="es-ES" sz="2200" b="0" i="0" u="none" strike="noStrike" cap="none" normalizeH="0" baseline="0" dirty="0" smtClean="0">
+                        <a:rPr kumimoji="0" lang="es-ES" sz="2200" b="0" i="0" u="none" strike="noStrike" cap="none" normalizeH="0" baseline="0" dirty="0">
                           <a:ln>
                             <a:noFill/>
                           </a:ln>
@@ -10370,6 +10578,11 @@
                   </a:txBody>
                   <a:tcPr marL="90000" marR="90000" marT="46797" marB="46797" horzOverflow="overflow"/>
                 </a:tc>
+                <a:extLst>
+                  <a:ext uri="{0D108BD9-81ED-4DB2-BD59-A6C34878D82A}">
+                    <a16:rowId xmlns:a16="http://schemas.microsoft.com/office/drawing/2014/main" val="10000"/>
+                  </a:ext>
+                </a:extLst>
               </a:tr>
               <a:tr h="370840">
                 <a:tc>
@@ -10396,7 +10609,7 @@
                         <a:tabLst/>
                       </a:pPr>
                       <a:r>
-                        <a:rPr kumimoji="0" lang="es-ES" sz="2800" b="0" i="0" u="none" strike="noStrike" cap="none" normalizeH="0" baseline="0" dirty="0" smtClean="0">
+                        <a:rPr kumimoji="0" lang="es-ES" sz="2800" b="0" i="0" u="none" strike="noStrike" cap="none" normalizeH="0" baseline="0" dirty="0">
                           <a:ln>
                             <a:noFill/>
                           </a:ln>
@@ -10436,7 +10649,7 @@
                         <a:tabLst/>
                       </a:pPr>
                       <a:r>
-                        <a:rPr kumimoji="0" lang="es-ES" sz="2800" b="0" i="0" u="none" strike="noStrike" cap="none" normalizeH="0" baseline="0" dirty="0" smtClean="0">
+                        <a:rPr kumimoji="0" lang="es-ES" sz="2800" b="0" i="0" u="none" strike="noStrike" cap="none" normalizeH="0" baseline="0" dirty="0">
                           <a:ln>
                             <a:noFill/>
                           </a:ln>
@@ -10452,6 +10665,11 @@
                   </a:txBody>
                   <a:tcPr marL="90000" marR="90000" marT="46797" marB="46797" horzOverflow="overflow"/>
                 </a:tc>
+                <a:extLst>
+                  <a:ext uri="{0D108BD9-81ED-4DB2-BD59-A6C34878D82A}">
+                    <a16:rowId xmlns:a16="http://schemas.microsoft.com/office/drawing/2014/main" val="10001"/>
+                  </a:ext>
+                </a:extLst>
               </a:tr>
               <a:tr h="370840">
                 <a:tc>
@@ -10478,7 +10696,7 @@
                         <a:tabLst/>
                       </a:pPr>
                       <a:r>
-                        <a:rPr kumimoji="0" lang="es-ES" sz="2800" b="0" i="0" u="none" strike="noStrike" cap="none" normalizeH="0" baseline="0" dirty="0" smtClean="0">
+                        <a:rPr kumimoji="0" lang="es-ES" sz="2800" b="0" i="0" u="none" strike="noStrike" cap="none" normalizeH="0" baseline="0" dirty="0">
                           <a:ln>
                             <a:noFill/>
                           </a:ln>
@@ -10518,7 +10736,7 @@
                         <a:tabLst/>
                       </a:pPr>
                       <a:r>
-                        <a:rPr kumimoji="0" lang="es-ES" sz="2800" b="0" i="0" u="none" strike="noStrike" cap="none" normalizeH="0" baseline="0" dirty="0" smtClean="0">
+                        <a:rPr kumimoji="0" lang="es-ES" sz="2800" b="0" i="0" u="none" strike="noStrike" cap="none" normalizeH="0" baseline="0" dirty="0">
                           <a:ln>
                             <a:noFill/>
                           </a:ln>
@@ -10534,6 +10752,11 @@
                   </a:txBody>
                   <a:tcPr marL="90000" marR="90000" marT="46797" marB="46797" horzOverflow="overflow"/>
                 </a:tc>
+                <a:extLst>
+                  <a:ext uri="{0D108BD9-81ED-4DB2-BD59-A6C34878D82A}">
+                    <a16:rowId xmlns:a16="http://schemas.microsoft.com/office/drawing/2014/main" val="10002"/>
+                  </a:ext>
+                </a:extLst>
               </a:tr>
               <a:tr h="370840">
                 <a:tc>
@@ -10560,7 +10783,7 @@
                         <a:tabLst/>
                       </a:pPr>
                       <a:r>
-                        <a:rPr kumimoji="0" lang="es-ES" sz="2800" b="0" i="0" u="none" strike="noStrike" cap="none" normalizeH="0" baseline="0" dirty="0" smtClean="0">
+                        <a:rPr kumimoji="0" lang="es-ES" sz="2800" b="0" i="0" u="none" strike="noStrike" cap="none" normalizeH="0" baseline="0" dirty="0">
                           <a:ln>
                             <a:noFill/>
                           </a:ln>
@@ -10600,7 +10823,7 @@
                         <a:tabLst/>
                       </a:pPr>
                       <a:r>
-                        <a:rPr kumimoji="0" lang="es-ES" sz="2800" b="0" i="0" u="none" strike="noStrike" cap="none" normalizeH="0" baseline="0" dirty="0" smtClean="0">
+                        <a:rPr kumimoji="0" lang="es-ES" sz="2800" b="0" i="0" u="none" strike="noStrike" cap="none" normalizeH="0" baseline="0" dirty="0">
                           <a:ln>
                             <a:noFill/>
                           </a:ln>
@@ -10616,6 +10839,11 @@
                   </a:txBody>
                   <a:tcPr marL="90000" marR="90000" marT="46797" marB="46797" horzOverflow="overflow"/>
                 </a:tc>
+                <a:extLst>
+                  <a:ext uri="{0D108BD9-81ED-4DB2-BD59-A6C34878D82A}">
+                    <a16:rowId xmlns:a16="http://schemas.microsoft.com/office/drawing/2014/main" val="10003"/>
+                  </a:ext>
+                </a:extLst>
               </a:tr>
               <a:tr h="370840">
                 <a:tc>
@@ -10642,7 +10870,7 @@
                         <a:tabLst/>
                       </a:pPr>
                       <a:r>
-                        <a:rPr kumimoji="0" lang="es-ES" sz="2800" b="0" i="0" u="none" strike="noStrike" cap="none" normalizeH="0" baseline="0" dirty="0" smtClean="0">
+                        <a:rPr kumimoji="0" lang="es-ES" sz="2800" b="0" i="0" u="none" strike="noStrike" cap="none" normalizeH="0" baseline="0" dirty="0">
                           <a:ln>
                             <a:noFill/>
                           </a:ln>
@@ -10682,7 +10910,7 @@
                         <a:tabLst/>
                       </a:pPr>
                       <a:r>
-                        <a:rPr kumimoji="0" lang="es-ES" sz="2800" b="0" i="0" u="none" strike="noStrike" cap="none" normalizeH="0" baseline="0" dirty="0" smtClean="0">
+                        <a:rPr kumimoji="0" lang="es-ES" sz="2800" b="0" i="0" u="none" strike="noStrike" cap="none" normalizeH="0" baseline="0" dirty="0">
                           <a:ln>
                             <a:noFill/>
                           </a:ln>
@@ -10698,6 +10926,11 @@
                   </a:txBody>
                   <a:tcPr marL="90000" marR="90000" marT="46797" marB="46797" horzOverflow="overflow"/>
                 </a:tc>
+                <a:extLst>
+                  <a:ext uri="{0D108BD9-81ED-4DB2-BD59-A6C34878D82A}">
+                    <a16:rowId xmlns:a16="http://schemas.microsoft.com/office/drawing/2014/main" val="10004"/>
+                  </a:ext>
+                </a:extLst>
               </a:tr>
               <a:tr h="370840">
                 <a:tc>
@@ -10724,7 +10957,7 @@
                         <a:tabLst/>
                       </a:pPr>
                       <a:r>
-                        <a:rPr kumimoji="0" lang="es-ES" sz="2800" b="0" i="0" u="none" strike="noStrike" cap="none" normalizeH="0" baseline="0" dirty="0" smtClean="0">
+                        <a:rPr kumimoji="0" lang="es-ES" sz="2800" b="0" i="0" u="none" strike="noStrike" cap="none" normalizeH="0" baseline="0" dirty="0">
                           <a:ln>
                             <a:noFill/>
                           </a:ln>
@@ -10764,7 +10997,7 @@
                         <a:tabLst/>
                       </a:pPr>
                       <a:r>
-                        <a:rPr kumimoji="0" lang="es-ES" sz="2800" b="0" i="0" u="none" strike="noStrike" cap="none" normalizeH="0" baseline="0" dirty="0" smtClean="0">
+                        <a:rPr kumimoji="0" lang="es-ES" sz="2800" b="0" i="0" u="none" strike="noStrike" cap="none" normalizeH="0" baseline="0" dirty="0">
                           <a:ln>
                             <a:noFill/>
                           </a:ln>
@@ -10780,6 +11013,11 @@
                   </a:txBody>
                   <a:tcPr marL="90000" marR="90000" marT="46797" marB="46797" horzOverflow="overflow"/>
                 </a:tc>
+                <a:extLst>
+                  <a:ext uri="{0D108BD9-81ED-4DB2-BD59-A6C34878D82A}">
+                    <a16:rowId xmlns:a16="http://schemas.microsoft.com/office/drawing/2014/main" val="10005"/>
+                  </a:ext>
+                </a:extLst>
               </a:tr>
             </a:tbl>
           </a:graphicData>
@@ -10816,27 +11054,8 @@
                 </a:effectLst>
                 <a:latin typeface="Franklin Gothic Medium" pitchFamily="34" charset="0"/>
               </a:rPr>
-              <a:t>(*): </a:t>
-            </a:r>
-            <a:r>
-              <a:rPr lang="es-ES" dirty="0" smtClean="0">
-                <a:effectLst>
-                  <a:outerShdw blurRad="38100" dist="38100" dir="2700000" algn="tl">
-                    <a:srgbClr val="000000"/>
-                  </a:outerShdw>
-                </a:effectLst>
-                <a:latin typeface="Franklin Gothic Medium" pitchFamily="34" charset="0"/>
-              </a:rPr>
-              <a:t>Acceso por defecto</a:t>
-            </a:r>
-            <a:endParaRPr lang="es-ES" dirty="0">
-              <a:effectLst>
-                <a:outerShdw blurRad="38100" dist="38100" dir="2700000" algn="tl">
-                  <a:srgbClr val="000000"/>
-                </a:outerShdw>
-              </a:effectLst>
-              <a:latin typeface="Franklin Gothic Medium" pitchFamily="34" charset="0"/>
-            </a:endParaRPr>
+              <a:t>(*): Acceso por defecto</a:t>
+            </a:r>
           </a:p>
         </p:txBody>
       </p:sp>
@@ -10850,13 +11069,6 @@
   <p:clrMapOvr>
     <a:masterClrMapping/>
   </p:clrMapOvr>
-  <p:timing>
-    <p:tnLst>
-      <p:par>
-        <p:cTn id="1" dur="indefinite" restart="never" nodeType="tmRoot"/>
-      </p:par>
-    </p:tnLst>
-  </p:timing>
 </p:sld>
 </file>
 
@@ -10893,10 +11105,9 @@
           <a:lstStyle/>
           <a:p>
             <a:r>
-              <a:rPr lang="es-AR" dirty="0" smtClean="0"/>
+              <a:rPr lang="es-AR" dirty="0"/>
               <a:t>Métodos (1/2)</a:t>
             </a:r>
-            <a:endParaRPr lang="es-AR" dirty="0"/>
           </a:p>
         </p:txBody>
       </p:sp>
@@ -11435,75 +11646,48 @@
                 <a:latin typeface="Arial Narrow" panose="020B0606020202030204" pitchFamily="34" charset="0"/>
                 <a:cs typeface="Times New Roman" panose="02020603050405020304" pitchFamily="18" charset="0"/>
               </a:rPr>
-              <a:t>[modificador] </a:t>
-            </a:r>
-            <a:r>
-              <a:rPr lang="es-AR" altLang="es-AR" sz="2000" b="1" dirty="0" smtClean="0">
-                <a:solidFill>
-                  <a:srgbClr val="0000FF"/>
+              <a:t>[modificador] retorno </a:t>
+            </a:r>
+            <a:r>
+              <a:rPr lang="es-AR" altLang="es-AR" sz="2000" b="1" dirty="0">
+                <a:solidFill>
+                  <a:srgbClr val="00B0F0"/>
                 </a:solidFill>
                 <a:latin typeface="Arial Narrow" panose="020B0606020202030204" pitchFamily="34" charset="0"/>
                 <a:cs typeface="Times New Roman" panose="02020603050405020304" pitchFamily="18" charset="0"/>
               </a:rPr>
-              <a:t>retorno </a:t>
+              <a:t>Identificador</a:t>
             </a:r>
             <a:r>
               <a:rPr lang="es-AR" altLang="es-AR" sz="2000" b="1" dirty="0">
                 <a:solidFill>
-                  <a:srgbClr val="00B0F0"/>
+                  <a:srgbClr val="000000"/>
                 </a:solidFill>
                 <a:latin typeface="Arial Narrow" panose="020B0606020202030204" pitchFamily="34" charset="0"/>
                 <a:cs typeface="Times New Roman" panose="02020603050405020304" pitchFamily="18" charset="0"/>
               </a:rPr>
-              <a:t>Identificador</a:t>
-            </a:r>
-            <a:r>
-              <a:rPr lang="es-AR" altLang="es-AR" sz="2000" b="1" dirty="0">
+              <a:t> ( [</a:t>
+            </a:r>
+            <a:r>
+              <a:rPr lang="es-AR" altLang="es-AR" sz="2000" b="1" dirty="0" err="1">
                 <a:solidFill>
                   <a:srgbClr val="000000"/>
                 </a:solidFill>
                 <a:latin typeface="Arial Narrow" panose="020B0606020202030204" pitchFamily="34" charset="0"/>
                 <a:cs typeface="Times New Roman" panose="02020603050405020304" pitchFamily="18" charset="0"/>
               </a:rPr>
-              <a:t> </a:t>
-            </a:r>
-            <a:r>
-              <a:rPr lang="es-AR" altLang="es-AR" sz="2000" b="1" dirty="0" smtClean="0">
+              <a:t>args</a:t>
+            </a:r>
+            <a:r>
+              <a:rPr lang="es-AR" altLang="es-AR" sz="2000" b="1" dirty="0">
                 <a:solidFill>
                   <a:srgbClr val="000000"/>
                 </a:solidFill>
                 <a:latin typeface="Arial Narrow" panose="020B0606020202030204" pitchFamily="34" charset="0"/>
                 <a:cs typeface="Times New Roman" panose="02020603050405020304" pitchFamily="18" charset="0"/>
               </a:rPr>
-              <a:t>( [</a:t>
-            </a:r>
-            <a:r>
-              <a:rPr lang="es-AR" altLang="es-AR" sz="2000" b="1" dirty="0" err="1" smtClean="0">
-                <a:solidFill>
-                  <a:srgbClr val="000000"/>
-                </a:solidFill>
-                <a:latin typeface="Arial Narrow" panose="020B0606020202030204" pitchFamily="34" charset="0"/>
-                <a:cs typeface="Times New Roman" panose="02020603050405020304" pitchFamily="18" charset="0"/>
-              </a:rPr>
-              <a:t>args</a:t>
-            </a:r>
-            <a:r>
-              <a:rPr lang="es-AR" altLang="es-AR" sz="2000" b="1" dirty="0" smtClean="0">
-                <a:solidFill>
-                  <a:srgbClr val="000000"/>
-                </a:solidFill>
-                <a:latin typeface="Arial Narrow" panose="020B0606020202030204" pitchFamily="34" charset="0"/>
-                <a:cs typeface="Times New Roman" panose="02020603050405020304" pitchFamily="18" charset="0"/>
-              </a:rPr>
               <a:t>] )</a:t>
             </a:r>
-            <a:endParaRPr lang="es-AR" altLang="es-AR" sz="2000" b="1" dirty="0">
-              <a:solidFill>
-                <a:srgbClr val="000000"/>
-              </a:solidFill>
-              <a:latin typeface="Arial Narrow" panose="020B0606020202030204" pitchFamily="34" charset="0"/>
-              <a:cs typeface="Times New Roman" panose="02020603050405020304" pitchFamily="18" charset="0"/>
-            </a:endParaRPr>
           </a:p>
           <a:p>
             <a:pPr marL="0" lvl="0" indent="0" defTabSz="914400" fontAlgn="base">
@@ -11564,25 +11748,8 @@
                 <a:latin typeface="Arial Narrow" panose="020B0606020202030204" pitchFamily="34" charset="0"/>
                 <a:cs typeface="Times New Roman" panose="02020603050405020304" pitchFamily="18" charset="0"/>
               </a:rPr>
-              <a:t>// </a:t>
-            </a:r>
-            <a:r>
-              <a:rPr lang="es-AR" altLang="es-AR" sz="2000" b="1" dirty="0" smtClean="0">
-                <a:solidFill>
-                  <a:srgbClr val="66CC66"/>
-                </a:solidFill>
-                <a:latin typeface="Arial Narrow" panose="020B0606020202030204" pitchFamily="34" charset="0"/>
-                <a:cs typeface="Times New Roman" panose="02020603050405020304" pitchFamily="18" charset="0"/>
-              </a:rPr>
-              <a:t>Sentencias</a:t>
-            </a:r>
-            <a:endParaRPr lang="es-AR" altLang="es-AR" sz="2000" b="1" dirty="0">
-              <a:solidFill>
-                <a:srgbClr val="66CC66"/>
-              </a:solidFill>
-              <a:latin typeface="Arial Narrow" panose="020B0606020202030204" pitchFamily="34" charset="0"/>
-              <a:cs typeface="Times New Roman" panose="02020603050405020304" pitchFamily="18" charset="0"/>
-            </a:endParaRPr>
+              <a:t>// Sentencias</a:t>
+            </a:r>
           </a:p>
           <a:p>
             <a:pPr marL="0" lvl="0" indent="0" defTabSz="914400" fontAlgn="base">
@@ -11645,13 +11812,6 @@
   <p:clrMapOvr>
     <a:masterClrMapping/>
   </p:clrMapOvr>
-  <p:timing>
-    <p:tnLst>
-      <p:par>
-        <p:cTn id="1" dur="indefinite" restart="never" nodeType="tmRoot"/>
-      </p:par>
-    </p:tnLst>
-  </p:timing>
 </p:sld>
 </file>
 
@@ -11689,15 +11849,7 @@
           <a:p>
             <a:r>
               <a:rPr lang="es-AR" dirty="0"/>
-              <a:t>Métodos </a:t>
-            </a:r>
-            <a:r>
-              <a:rPr lang="es-AR" dirty="0" smtClean="0"/>
-              <a:t>(2/2</a:t>
-            </a:r>
-            <a:r>
-              <a:rPr lang="es-AR" dirty="0"/>
-              <a:t>)</a:t>
+              <a:t>Métodos (2/2)</a:t>
             </a:r>
           </a:p>
         </p:txBody>
@@ -11769,20 +11921,7 @@
                 </a:effectLst>
                 <a:latin typeface="Franklin Gothic Medium" panose="020B0603020102020204" pitchFamily="34" charset="0"/>
               </a:rPr>
-              <a:t>Los parámetros se definen como</a:t>
-            </a:r>
-            <a:r>
-              <a:rPr lang="es-ES" sz="2800" dirty="0" smtClean="0">
-                <a:effectLst>
-                  <a:outerShdw blurRad="38100" dist="38100" dir="2700000" algn="tl">
-                    <a:srgbClr val="000000">
-                      <a:alpha val="43137"/>
-                    </a:srgbClr>
-                  </a:outerShdw>
-                </a:effectLst>
-                <a:latin typeface="Franklin Gothic Medium" panose="020B0603020102020204" pitchFamily="34" charset="0"/>
-              </a:rPr>
-              <a:t>:</a:t>
+              <a:t>Los parámetros se definen como:</a:t>
             </a:r>
           </a:p>
           <a:p>
@@ -11911,7 +12050,7 @@
               <a:t>return</a:t>
             </a:r>
             <a:r>
-              <a:rPr lang="es-ES" sz="2800" dirty="0" smtClean="0">
+              <a:rPr lang="es-ES" sz="2800" dirty="0">
                 <a:effectLst>
                   <a:outerShdw blurRad="38100" dist="38100" dir="2700000" algn="tl">
                     <a:srgbClr val="000000">
@@ -12226,7 +12365,7 @@
               <a:buNone/>
             </a:pPr>
             <a:r>
-              <a:rPr lang="es-AR" altLang="es-AR" sz="2000" b="1" dirty="0" smtClean="0">
+              <a:rPr lang="es-AR" altLang="es-AR" sz="2000" b="1" dirty="0">
                 <a:solidFill>
                   <a:srgbClr val="0000FF"/>
                 </a:solidFill>
@@ -12236,7 +12375,7 @@
               <a:t>tipo </a:t>
             </a:r>
             <a:r>
-              <a:rPr lang="es-AR" altLang="es-AR" sz="2000" b="1" dirty="0" smtClean="0">
+              <a:rPr lang="es-AR" altLang="es-AR" sz="2000" b="1" dirty="0">
                 <a:solidFill>
                   <a:schemeClr val="bg1"/>
                 </a:solidFill>
@@ -12265,13 +12404,6 @@
   <p:clrMapOvr>
     <a:masterClrMapping/>
   </p:clrMapOvr>
-  <p:timing>
-    <p:tnLst>
-      <p:par>
-        <p:cTn id="1" dur="indefinite" restart="never" nodeType="tmRoot"/>
-      </p:par>
-    </p:tnLst>
-  </p:timing>
 </p:sld>
 </file>
 
@@ -12317,8 +12449,20 @@
                 <a:tableStyleId>{5C22544A-7EE6-4342-B048-85BDC9FD1C3A}</a:tableStyleId>
               </a:tblPr>
               <a:tblGrid>
-                <a:gridCol w="5152572"/>
-                <a:gridCol w="5152572"/>
+                <a:gridCol w="5152572">
+                  <a:extLst>
+                    <a:ext uri="{9D8B030D-6E8A-4147-A177-3AD203B41FA5}">
+                      <a16:colId xmlns:a16="http://schemas.microsoft.com/office/drawing/2014/main" val="20000"/>
+                    </a:ext>
+                  </a:extLst>
+                </a:gridCol>
+                <a:gridCol w="5152572">
+                  <a:extLst>
+                    <a:ext uri="{9D8B030D-6E8A-4147-A177-3AD203B41FA5}">
+                      <a16:colId xmlns:a16="http://schemas.microsoft.com/office/drawing/2014/main" val="20001"/>
+                    </a:ext>
+                  </a:extLst>
+                </a:gridCol>
               </a:tblGrid>
               <a:tr h="370840">
                 <a:tc>
@@ -12345,7 +12489,7 @@
                         <a:tabLst/>
                       </a:pPr>
                       <a:r>
-                        <a:rPr kumimoji="0" lang="es-ES" sz="2200" b="0" i="0" u="none" strike="noStrike" cap="none" normalizeH="0" baseline="0" dirty="0" smtClean="0">
+                        <a:rPr kumimoji="0" lang="es-ES" sz="2200" b="0" i="0" u="none" strike="noStrike" cap="none" normalizeH="0" baseline="0" dirty="0">
                           <a:ln>
                             <a:noFill/>
                           </a:ln>
@@ -12385,7 +12529,7 @@
                         <a:tabLst/>
                       </a:pPr>
                       <a:r>
-                        <a:rPr kumimoji="0" lang="es-ES" sz="2200" b="0" i="0" u="none" strike="noStrike" cap="none" normalizeH="0" baseline="0" dirty="0" smtClean="0">
+                        <a:rPr kumimoji="0" lang="es-ES" sz="2200" b="0" i="0" u="none" strike="noStrike" cap="none" normalizeH="0" baseline="0" dirty="0">
                           <a:ln>
                             <a:noFill/>
                           </a:ln>
@@ -12401,6 +12545,11 @@
                   </a:txBody>
                   <a:tcPr marL="90000" marR="90000" marT="46797" marB="46797" horzOverflow="overflow"/>
                 </a:tc>
+                <a:extLst>
+                  <a:ext uri="{0D108BD9-81ED-4DB2-BD59-A6C34878D82A}">
+                    <a16:rowId xmlns:a16="http://schemas.microsoft.com/office/drawing/2014/main" val="10000"/>
+                  </a:ext>
+                </a:extLst>
               </a:tr>
               <a:tr h="370840">
                 <a:tc>
@@ -12427,7 +12576,7 @@
                         <a:tabLst/>
                       </a:pPr>
                       <a:r>
-                        <a:rPr kumimoji="0" lang="es-ES" sz="2400" b="0" i="0" u="none" strike="noStrike" cap="none" normalizeH="0" baseline="0" dirty="0" smtClean="0">
+                        <a:rPr kumimoji="0" lang="es-ES" sz="2400" b="0" i="0" u="none" strike="noStrike" cap="none" normalizeH="0" baseline="0" dirty="0">
                           <a:ln>
                             <a:noFill/>
                           </a:ln>
@@ -12467,7 +12616,7 @@
                         <a:tabLst/>
                       </a:pPr>
                       <a:r>
-                        <a:rPr kumimoji="0" lang="es-ES" sz="2400" b="0" i="0" u="none" strike="noStrike" cap="none" normalizeH="0" baseline="0" dirty="0" smtClean="0">
+                        <a:rPr kumimoji="0" lang="es-ES" sz="2400" b="0" i="0" u="none" strike="noStrike" cap="none" normalizeH="0" baseline="0" dirty="0">
                           <a:ln>
                             <a:noFill/>
                           </a:ln>
@@ -12483,6 +12632,11 @@
                   </a:txBody>
                   <a:tcPr marL="90000" marR="90000" marT="46805" marB="46805" horzOverflow="overflow"/>
                 </a:tc>
+                <a:extLst>
+                  <a:ext uri="{0D108BD9-81ED-4DB2-BD59-A6C34878D82A}">
+                    <a16:rowId xmlns:a16="http://schemas.microsoft.com/office/drawing/2014/main" val="10001"/>
+                  </a:ext>
+                </a:extLst>
               </a:tr>
               <a:tr h="370840">
                 <a:tc>
@@ -12509,7 +12663,7 @@
                         <a:tabLst/>
                       </a:pPr>
                       <a:r>
-                        <a:rPr kumimoji="0" lang="es-ES" sz="2400" b="0" i="0" u="none" strike="noStrike" cap="none" normalizeH="0" baseline="0" dirty="0" smtClean="0">
+                        <a:rPr kumimoji="0" lang="es-ES" sz="2400" b="0" i="0" u="none" strike="noStrike" cap="none" normalizeH="0" baseline="0" dirty="0">
                           <a:ln>
                             <a:noFill/>
                           </a:ln>
@@ -12549,7 +12703,7 @@
                         <a:tabLst/>
                       </a:pPr>
                       <a:r>
-                        <a:rPr kumimoji="0" lang="es-ES" sz="2400" b="0" i="0" u="none" strike="noStrike" cap="none" normalizeH="0" baseline="0" dirty="0" smtClean="0">
+                        <a:rPr kumimoji="0" lang="es-ES" sz="2400" b="0" i="0" u="none" strike="noStrike" cap="none" normalizeH="0" baseline="0" dirty="0">
                           <a:ln>
                             <a:noFill/>
                           </a:ln>
@@ -12565,6 +12719,11 @@
                   </a:txBody>
                   <a:tcPr marL="90000" marR="90000" marT="46805" marB="46805" horzOverflow="overflow"/>
                 </a:tc>
+                <a:extLst>
+                  <a:ext uri="{0D108BD9-81ED-4DB2-BD59-A6C34878D82A}">
+                    <a16:rowId xmlns:a16="http://schemas.microsoft.com/office/drawing/2014/main" val="10002"/>
+                  </a:ext>
+                </a:extLst>
               </a:tr>
               <a:tr h="370840">
                 <a:tc>
@@ -12591,7 +12750,7 @@
                         <a:tabLst/>
                       </a:pPr>
                       <a:r>
-                        <a:rPr kumimoji="0" lang="es-ES" sz="2400" b="0" i="0" u="none" strike="noStrike" cap="none" normalizeH="0" baseline="0" dirty="0" smtClean="0">
+                        <a:rPr kumimoji="0" lang="es-ES" sz="2400" b="0" i="0" u="none" strike="noStrike" cap="none" normalizeH="0" baseline="0" dirty="0">
                           <a:ln>
                             <a:noFill/>
                           </a:ln>
@@ -12631,7 +12790,7 @@
                         <a:tabLst/>
                       </a:pPr>
                       <a:r>
-                        <a:rPr kumimoji="0" lang="es-ES" sz="2400" b="0" i="0" u="none" strike="noStrike" cap="none" normalizeH="0" baseline="0" dirty="0" smtClean="0">
+                        <a:rPr kumimoji="0" lang="es-ES" sz="2400" b="0" i="0" u="none" strike="noStrike" cap="none" normalizeH="0" baseline="0" dirty="0">
                           <a:ln>
                             <a:noFill/>
                           </a:ln>
@@ -12647,6 +12806,11 @@
                   </a:txBody>
                   <a:tcPr marL="90000" marR="90000" marT="46805" marB="46805" horzOverflow="overflow"/>
                 </a:tc>
+                <a:extLst>
+                  <a:ext uri="{0D108BD9-81ED-4DB2-BD59-A6C34878D82A}">
+                    <a16:rowId xmlns:a16="http://schemas.microsoft.com/office/drawing/2014/main" val="10003"/>
+                  </a:ext>
+                </a:extLst>
               </a:tr>
               <a:tr h="370840">
                 <a:tc>
@@ -12673,7 +12837,7 @@
                         <a:tabLst/>
                       </a:pPr>
                       <a:r>
-                        <a:rPr kumimoji="0" lang="es-ES" sz="2400" b="0" i="0" u="none" strike="noStrike" cap="none" normalizeH="0" baseline="0" dirty="0" smtClean="0">
+                        <a:rPr kumimoji="0" lang="es-ES" sz="2400" b="0" i="0" u="none" strike="noStrike" cap="none" normalizeH="0" baseline="0" dirty="0">
                           <a:ln>
                             <a:noFill/>
                           </a:ln>
@@ -12713,7 +12877,7 @@
                         <a:tabLst/>
                       </a:pPr>
                       <a:r>
-                        <a:rPr kumimoji="0" lang="es-ES" sz="2400" b="0" i="0" u="none" strike="noStrike" cap="none" normalizeH="0" baseline="0" dirty="0" smtClean="0">
+                        <a:rPr kumimoji="0" lang="es-ES" sz="2400" b="0" i="0" u="none" strike="noStrike" cap="none" normalizeH="0" baseline="0" dirty="0">
                           <a:ln>
                             <a:noFill/>
                           </a:ln>
@@ -12726,7 +12890,7 @@
                         <a:t>Reemplaza la implementación del mismo método declarado como </a:t>
                       </a:r>
                       <a:r>
-                        <a:rPr kumimoji="0" lang="es-ES" sz="2400" b="1" i="1" u="none" strike="noStrike" cap="none" normalizeH="0" baseline="0" dirty="0" smtClean="0">
+                        <a:rPr kumimoji="0" lang="es-ES" sz="2400" b="1" i="1" u="none" strike="noStrike" cap="none" normalizeH="0" baseline="0" dirty="0">
                           <a:ln>
                             <a:noFill/>
                           </a:ln>
@@ -12739,7 +12903,7 @@
                         <a:t>virtual</a:t>
                       </a:r>
                       <a:r>
-                        <a:rPr kumimoji="0" lang="es-ES" sz="2400" b="0" i="0" u="none" strike="noStrike" cap="none" normalizeH="0" baseline="0" dirty="0" smtClean="0">
+                        <a:rPr kumimoji="0" lang="es-ES" sz="2400" b="0" i="0" u="none" strike="noStrike" cap="none" normalizeH="0" baseline="0" dirty="0">
                           <a:ln>
                             <a:noFill/>
                           </a:ln>
@@ -12755,6 +12919,11 @@
                   </a:txBody>
                   <a:tcPr marL="90000" marR="90000" marT="46805" marB="46805" horzOverflow="overflow"/>
                 </a:tc>
+                <a:extLst>
+                  <a:ext uri="{0D108BD9-81ED-4DB2-BD59-A6C34878D82A}">
+                    <a16:rowId xmlns:a16="http://schemas.microsoft.com/office/drawing/2014/main" val="10004"/>
+                  </a:ext>
+                </a:extLst>
               </a:tr>
               <a:tr h="0">
                 <a:tc>
@@ -12781,7 +12950,7 @@
                         <a:tabLst/>
                       </a:pPr>
                       <a:r>
-                        <a:rPr kumimoji="0" lang="es-ES" sz="2400" b="0" i="0" u="none" strike="noStrike" cap="none" normalizeH="0" baseline="0" dirty="0" smtClean="0">
+                        <a:rPr kumimoji="0" lang="es-ES" sz="2400" b="0" i="0" u="none" strike="noStrike" cap="none" normalizeH="0" baseline="0" dirty="0">
                           <a:ln>
                             <a:noFill/>
                           </a:ln>
@@ -12821,7 +12990,7 @@
                         <a:tabLst/>
                       </a:pPr>
                       <a:r>
-                        <a:rPr kumimoji="0" lang="es-ES" sz="2400" b="0" i="0" u="none" strike="noStrike" cap="none" normalizeH="0" baseline="0" dirty="0" smtClean="0">
+                        <a:rPr kumimoji="0" lang="es-ES" sz="2400" b="0" i="0" u="none" strike="noStrike" cap="none" normalizeH="0" baseline="0" dirty="0">
                           <a:ln>
                             <a:noFill/>
                           </a:ln>
@@ -12837,6 +13006,11 @@
                   </a:txBody>
                   <a:tcPr marL="90000" marR="90000" marT="46805" marB="46805" horzOverflow="overflow"/>
                 </a:tc>
+                <a:extLst>
+                  <a:ext uri="{0D108BD9-81ED-4DB2-BD59-A6C34878D82A}">
+                    <a16:rowId xmlns:a16="http://schemas.microsoft.com/office/drawing/2014/main" val="10005"/>
+                  </a:ext>
+                </a:extLst>
               </a:tr>
               <a:tr h="338235">
                 <a:tc>
@@ -12863,7 +13037,7 @@
                         <a:tabLst/>
                       </a:pPr>
                       <a:r>
-                        <a:rPr kumimoji="0" lang="es-ES" sz="2400" b="0" i="0" u="none" strike="noStrike" cap="none" normalizeH="0" baseline="0" dirty="0" smtClean="0">
+                        <a:rPr kumimoji="0" lang="es-ES" sz="2400" b="0" i="0" u="none" strike="noStrike" cap="none" normalizeH="0" baseline="0" dirty="0">
                           <a:ln>
                             <a:noFill/>
                           </a:ln>
@@ -12903,7 +13077,7 @@
                         <a:tabLst/>
                       </a:pPr>
                       <a:r>
-                        <a:rPr kumimoji="0" lang="es-ES" sz="2400" b="0" i="0" u="none" strike="noStrike" cap="none" normalizeH="0" baseline="0" dirty="0" smtClean="0">
+                        <a:rPr kumimoji="0" lang="es-ES" sz="2400" b="0" i="0" u="none" strike="noStrike" cap="none" normalizeH="0" baseline="0" dirty="0">
                           <a:ln>
                             <a:noFill/>
                           </a:ln>
@@ -12919,6 +13093,11 @@
                   </a:txBody>
                   <a:tcPr marL="90000" marR="90000" marT="46805" marB="46805" horzOverflow="overflow"/>
                 </a:tc>
+                <a:extLst>
+                  <a:ext uri="{0D108BD9-81ED-4DB2-BD59-A6C34878D82A}">
+                    <a16:rowId xmlns:a16="http://schemas.microsoft.com/office/drawing/2014/main" val="10006"/>
+                  </a:ext>
+                </a:extLst>
               </a:tr>
               <a:tr h="253676">
                 <a:tc>
@@ -12945,7 +13124,7 @@
                         <a:tabLst/>
                       </a:pPr>
                       <a:r>
-                        <a:rPr kumimoji="0" lang="es-ES" sz="2400" b="0" i="0" u="none" strike="noStrike" cap="none" normalizeH="0" baseline="0" dirty="0" smtClean="0">
+                        <a:rPr kumimoji="0" lang="es-ES" sz="2400" b="0" i="0" u="none" strike="noStrike" cap="none" normalizeH="0" baseline="0" dirty="0">
                           <a:ln>
                             <a:noFill/>
                           </a:ln>
@@ -12985,7 +13164,7 @@
                         <a:tabLst/>
                       </a:pPr>
                       <a:r>
-                        <a:rPr kumimoji="0" lang="es-ES" sz="2400" b="0" i="0" u="none" strike="noStrike" cap="none" normalizeH="0" baseline="0" dirty="0" smtClean="0">
+                        <a:rPr kumimoji="0" lang="es-ES" sz="2400" b="0" i="0" u="none" strike="noStrike" cap="none" normalizeH="0" baseline="0" dirty="0">
                           <a:ln>
                             <a:noFill/>
                           </a:ln>
@@ -13001,6 +13180,11 @@
                   </a:txBody>
                   <a:tcPr marL="90000" marR="90000" marT="46805" marB="46805" horzOverflow="overflow"/>
                 </a:tc>
+                <a:extLst>
+                  <a:ext uri="{0D108BD9-81ED-4DB2-BD59-A6C34878D82A}">
+                    <a16:rowId xmlns:a16="http://schemas.microsoft.com/office/drawing/2014/main" val="10007"/>
+                  </a:ext>
+                </a:extLst>
               </a:tr>
               <a:tr h="169118">
                 <a:tc>
@@ -13027,7 +13211,7 @@
                         <a:tabLst/>
                       </a:pPr>
                       <a:r>
-                        <a:rPr kumimoji="0" lang="es-ES" sz="2400" b="0" i="0" u="none" strike="noStrike" cap="none" normalizeH="0" baseline="0" dirty="0" smtClean="0">
+                        <a:rPr kumimoji="0" lang="es-ES" sz="2400" b="0" i="0" u="none" strike="noStrike" cap="none" normalizeH="0" baseline="0" dirty="0">
                           <a:ln>
                             <a:noFill/>
                           </a:ln>
@@ -13067,7 +13251,7 @@
                         <a:tabLst/>
                       </a:pPr>
                       <a:r>
-                        <a:rPr kumimoji="0" lang="es-ES" sz="2400" b="0" i="0" u="none" strike="noStrike" cap="none" normalizeH="0" baseline="0" dirty="0" smtClean="0">
+                        <a:rPr kumimoji="0" lang="es-ES" sz="2400" b="0" i="0" u="none" strike="noStrike" cap="none" normalizeH="0" baseline="0" dirty="0">
                           <a:ln>
                             <a:noFill/>
                           </a:ln>
@@ -13083,6 +13267,11 @@
                   </a:txBody>
                   <a:tcPr marL="90000" marR="90000" marT="46805" marB="46805" horzOverflow="overflow"/>
                 </a:tc>
+                <a:extLst>
+                  <a:ext uri="{0D108BD9-81ED-4DB2-BD59-A6C34878D82A}">
+                    <a16:rowId xmlns:a16="http://schemas.microsoft.com/office/drawing/2014/main" val="10008"/>
+                  </a:ext>
+                </a:extLst>
               </a:tr>
               <a:tr h="0">
                 <a:tc>
@@ -13109,7 +13298,7 @@
                         <a:tabLst/>
                       </a:pPr>
                       <a:r>
-                        <a:rPr kumimoji="0" lang="es-ES" sz="2400" b="0" i="0" u="none" strike="noStrike" cap="none" normalizeH="0" baseline="0" dirty="0" smtClean="0">
+                        <a:rPr kumimoji="0" lang="es-ES" sz="2400" b="0" i="0" u="none" strike="noStrike" cap="none" normalizeH="0" baseline="0" dirty="0">
                           <a:ln>
                             <a:noFill/>
                           </a:ln>
@@ -13149,7 +13338,7 @@
                         <a:tabLst/>
                       </a:pPr>
                       <a:r>
-                        <a:rPr kumimoji="0" lang="es-ES" sz="2400" b="0" i="0" u="none" strike="noStrike" cap="none" normalizeH="0" baseline="0" dirty="0" smtClean="0">
+                        <a:rPr kumimoji="0" lang="es-ES" sz="2400" b="0" i="0" u="none" strike="noStrike" cap="none" normalizeH="0" baseline="0" dirty="0">
                           <a:ln>
                             <a:noFill/>
                           </a:ln>
@@ -13165,6 +13354,11 @@
                   </a:txBody>
                   <a:tcPr marL="90000" marR="90000" marT="46805" marB="46805" horzOverflow="overflow"/>
                 </a:tc>
+                <a:extLst>
+                  <a:ext uri="{0D108BD9-81ED-4DB2-BD59-A6C34878D82A}">
+                    <a16:rowId xmlns:a16="http://schemas.microsoft.com/office/drawing/2014/main" val="10009"/>
+                  </a:ext>
+                </a:extLst>
               </a:tr>
             </a:tbl>
           </a:graphicData>
@@ -13204,7 +13398,7 @@
               <a:t>(*): </a:t>
             </a:r>
             <a:r>
-              <a:rPr lang="es-ES" dirty="0" err="1" smtClean="0">
+              <a:rPr lang="es-ES" dirty="0" err="1">
                 <a:effectLst>
                   <a:outerShdw blurRad="38100" dist="38100" dir="2700000" algn="tl">
                     <a:srgbClr val="000000"/>
@@ -13215,7 +13409,7 @@
               <a:t>Accesor</a:t>
             </a:r>
             <a:r>
-              <a:rPr lang="es-ES" dirty="0" smtClean="0">
+              <a:rPr lang="es-ES" dirty="0">
                 <a:effectLst>
                   <a:outerShdw blurRad="38100" dist="38100" dir="2700000" algn="tl">
                     <a:srgbClr val="000000"/>
@@ -13238,13 +13432,6 @@
   <p:clrMapOvr>
     <a:masterClrMapping/>
   </p:clrMapOvr>
-  <p:timing>
-    <p:tnLst>
-      <p:par>
-        <p:cTn id="1" dur="indefinite" restart="never" nodeType="tmRoot"/>
-      </p:par>
-    </p:tnLst>
-  </p:timing>
 </p:sld>
 </file>
 
@@ -13281,10 +13468,9 @@
           <a:lstStyle/>
           <a:p>
             <a:r>
-              <a:rPr lang="es-AR" dirty="0" smtClean="0"/>
+              <a:rPr lang="es-AR" dirty="0"/>
               <a:t>Ejemplo</a:t>
             </a:r>
-            <a:endParaRPr lang="es-AR" dirty="0"/>
           </a:p>
         </p:txBody>
       </p:sp>
@@ -14233,13 +14419,6 @@
   <p:clrMapOvr>
     <a:masterClrMapping/>
   </p:clrMapOvr>
-  <p:timing>
-    <p:tnLst>
-      <p:par>
-        <p:cTn id="1" dur="indefinite" restart="never" nodeType="tmRoot"/>
-      </p:par>
-    </p:tnLst>
-  </p:timing>
 </p:sld>
 </file>
 
@@ -14276,7 +14455,7 @@
           <a:lstStyle/>
           <a:p>
             <a:r>
-              <a:rPr lang="es-AR" dirty="0" err="1" smtClean="0"/>
+              <a:rPr lang="es-AR" dirty="0" err="1"/>
               <a:t>Namespace</a:t>
             </a:r>
             <a:endParaRPr lang="es-AR" dirty="0"/>
@@ -14498,13 +14677,6 @@
   <p:clrMapOvr>
     <a:masterClrMapping/>
   </p:clrMapOvr>
-  <p:timing>
-    <p:tnLst>
-      <p:par>
-        <p:cTn id="1" dur="indefinite" restart="never" nodeType="tmRoot"/>
-      </p:par>
-    </p:tnLst>
-  </p:timing>
 </p:sld>
 </file>
 
@@ -14541,7 +14713,7 @@
           <a:lstStyle/>
           <a:p>
             <a:r>
-              <a:rPr lang="es-AR" dirty="0" err="1" smtClean="0"/>
+              <a:rPr lang="es-AR" dirty="0" err="1"/>
               <a:t>Namespace</a:t>
             </a:r>
             <a:endParaRPr lang="es-AR" dirty="0"/>
@@ -14618,7 +14790,7 @@
               <a:defRPr/>
             </a:pPr>
             <a:r>
-              <a:rPr lang="es-ES" sz="2800" dirty="0" smtClean="0">
+              <a:rPr lang="es-ES" sz="2800" dirty="0">
                 <a:effectLst>
                   <a:outerShdw blurRad="38100" dist="38100" dir="2700000" algn="tl">
                     <a:srgbClr val="000000">
@@ -14630,16 +14802,6 @@
               </a:rPr>
               <a:t>Siendo:</a:t>
             </a:r>
-            <a:endParaRPr lang="es-ES" sz="2800" dirty="0">
-              <a:effectLst>
-                <a:outerShdw blurRad="38100" dist="38100" dir="2700000" algn="tl">
-                  <a:srgbClr val="000000">
-                    <a:alpha val="43137"/>
-                  </a:srgbClr>
-                </a:outerShdw>
-              </a:effectLst>
-              <a:latin typeface="Franklin Gothic Medium" panose="020B0603020102020204" pitchFamily="34" charset="0"/>
-            </a:endParaRPr>
           </a:p>
           <a:p>
             <a:pPr lvl="1">
@@ -14881,7 +15043,7 @@
               <a:t>Console</a:t>
             </a:r>
             <a:r>
-              <a:rPr lang="es-ES" dirty="0" smtClean="0">
+              <a:rPr lang="es-ES" dirty="0">
                 <a:effectLst>
                   <a:outerShdw blurRad="38100" dist="38100" dir="2700000" algn="tl">
                     <a:srgbClr val="000000">
@@ -14893,16 +15055,6 @@
               </a:rPr>
               <a:t>.</a:t>
             </a:r>
-            <a:endParaRPr lang="es-ES" dirty="0">
-              <a:effectLst>
-                <a:outerShdw blurRad="38100" dist="38100" dir="2700000" algn="tl">
-                  <a:srgbClr val="000000">
-                    <a:alpha val="43137"/>
-                  </a:srgbClr>
-                </a:outerShdw>
-              </a:effectLst>
-              <a:latin typeface="Franklin Gothic Medium" panose="020B0603020102020204" pitchFamily="34" charset="0"/>
-            </a:endParaRPr>
           </a:p>
         </p:txBody>
       </p:sp>
@@ -14916,13 +15068,6 @@
   <p:clrMapOvr>
     <a:masterClrMapping/>
   </p:clrMapOvr>
-  <p:timing>
-    <p:tnLst>
-      <p:par>
-        <p:cTn id="1" dur="indefinite" restart="never" nodeType="tmRoot"/>
-      </p:par>
-    </p:tnLst>
-  </p:timing>
 </p:sld>
 </file>
 
@@ -14959,10 +15104,9 @@
           <a:lstStyle/>
           <a:p>
             <a:r>
-              <a:rPr lang="es-AR" dirty="0" smtClean="0"/>
+              <a:rPr lang="es-AR" dirty="0"/>
               <a:t>Directivas</a:t>
             </a:r>
-            <a:endParaRPr lang="es-AR" dirty="0"/>
           </a:p>
         </p:txBody>
       </p:sp>
@@ -15213,13 +15357,6 @@
   <p:clrMapOvr>
     <a:masterClrMapping/>
   </p:clrMapOvr>
-  <p:timing>
-    <p:tnLst>
-      <p:par>
-        <p:cTn id="1" dur="indefinite" restart="never" nodeType="tmRoot"/>
-      </p:par>
-    </p:tnLst>
-  </p:timing>
 </p:sld>
 </file>
 
@@ -15256,10 +15393,9 @@
           <a:lstStyle/>
           <a:p>
             <a:r>
-              <a:rPr lang="es-AR" dirty="0" smtClean="0"/>
+              <a:rPr lang="es-AR" dirty="0"/>
               <a:t>P.O.O.</a:t>
             </a:r>
-            <a:endParaRPr lang="es-AR" dirty="0"/>
           </a:p>
         </p:txBody>
       </p:sp>
@@ -15431,13 +15567,6 @@
   <p:clrMapOvr>
     <a:masterClrMapping/>
   </p:clrMapOvr>
-  <p:timing>
-    <p:tnLst>
-      <p:par>
-        <p:cTn id="1" dur="indefinite" restart="never" nodeType="tmRoot"/>
-      </p:par>
-    </p:tnLst>
-  </p:timing>
 </p:sld>
 </file>
 
@@ -15474,7 +15603,7 @@
           <a:lstStyle/>
           <a:p>
             <a:r>
-              <a:rPr lang="es-AR" dirty="0" err="1" smtClean="0"/>
+              <a:rPr lang="es-AR" dirty="0" err="1"/>
               <a:t>Using</a:t>
             </a:r>
             <a:endParaRPr lang="es-AR" dirty="0"/>
@@ -16153,13 +16282,6 @@
   <p:clrMapOvr>
     <a:masterClrMapping/>
   </p:clrMapOvr>
-  <p:timing>
-    <p:tnLst>
-      <p:par>
-        <p:cTn id="1" dur="indefinite" restart="never" nodeType="tmRoot"/>
-      </p:par>
-    </p:tnLst>
-  </p:timing>
 </p:sld>
 </file>
 
@@ -16196,10 +16318,9 @@
           <a:lstStyle/>
           <a:p>
             <a:r>
-              <a:rPr lang="es-AR" dirty="0" smtClean="0"/>
+              <a:rPr lang="es-AR" dirty="0"/>
               <a:t>Alias</a:t>
             </a:r>
-            <a:endParaRPr lang="es-AR" dirty="0"/>
           </a:p>
         </p:txBody>
       </p:sp>
@@ -16221,7 +16342,7 @@
           <a:lstStyle/>
           <a:p>
             <a:r>
-              <a:rPr lang="es-AR" sz="2800" dirty="0" smtClean="0">
+              <a:rPr lang="es-AR" sz="2800" dirty="0">
                 <a:effectLst>
                   <a:outerShdw blurRad="38100" dist="38100" dir="2700000" algn="tl">
                     <a:srgbClr val="000000">
@@ -16234,7 +16355,7 @@
               <a:t>Permite utilizar un nombre distinto para un </a:t>
             </a:r>
             <a:r>
-              <a:rPr lang="es-AR" sz="2800" dirty="0" err="1" smtClean="0">
+              <a:rPr lang="es-AR" sz="2800" dirty="0" err="1">
                 <a:effectLst>
                   <a:outerShdw blurRad="38100" dist="38100" dir="2700000" algn="tl">
                     <a:srgbClr val="000000">
@@ -16247,7 +16368,7 @@
               <a:t>Namespace</a:t>
             </a:r>
             <a:r>
-              <a:rPr lang="es-AR" sz="2800" dirty="0" smtClean="0">
+              <a:rPr lang="es-AR" sz="2800" dirty="0">
                 <a:effectLst>
                   <a:outerShdw blurRad="38100" dist="38100" dir="2700000" algn="tl">
                     <a:srgbClr val="000000">
@@ -16262,7 +16383,7 @@
           </a:p>
           <a:p>
             <a:r>
-              <a:rPr lang="es-AR" sz="2800" dirty="0" smtClean="0">
+              <a:rPr lang="es-AR" sz="2800" dirty="0">
                 <a:effectLst>
                   <a:outerShdw blurRad="38100" dist="38100" dir="2700000" algn="tl">
                     <a:srgbClr val="000000">
@@ -16274,16 +16395,6 @@
               </a:rPr>
               <a:t>Generalmente se utiliza para abreviar nombres largos.</a:t>
             </a:r>
-            <a:endParaRPr lang="es-AR" sz="2800" dirty="0">
-              <a:effectLst>
-                <a:outerShdw blurRad="38100" dist="38100" dir="2700000" algn="tl">
-                  <a:srgbClr val="000000">
-                    <a:alpha val="43137"/>
-                  </a:srgbClr>
-                </a:outerShdw>
-              </a:effectLst>
-              <a:latin typeface="Franklin Gothic Medium" panose="020B0603020102020204" pitchFamily="34" charset="0"/>
-            </a:endParaRPr>
           </a:p>
         </p:txBody>
       </p:sp>
@@ -16596,7 +16707,7 @@
               <a:t>System.Console</a:t>
             </a:r>
             <a:r>
-              <a:rPr lang="es-AR" sz="2000" dirty="0" smtClean="0">
+              <a:rPr lang="es-AR" sz="2000" dirty="0">
                 <a:solidFill>
                   <a:srgbClr val="000000"/>
                 </a:solidFill>
@@ -16611,16 +16722,7 @@
                 </a:solidFill>
                 <a:latin typeface="Consolas" panose="020B0609020204030204" pitchFamily="49" charset="0"/>
               </a:rPr>
-              <a:t>//Directiva </a:t>
-            </a:r>
-            <a:r>
-              <a:rPr lang="es-AR" sz="2000" dirty="0" smtClean="0">
-                <a:solidFill>
-                  <a:srgbClr val="008000"/>
-                </a:solidFill>
-                <a:latin typeface="Consolas" panose="020B0609020204030204" pitchFamily="49" charset="0"/>
-              </a:rPr>
-              <a:t>ALIAS</a:t>
+              <a:t>//Directiva ALIAS</a:t>
             </a:r>
             <a:endParaRPr lang="es-AR" sz="2000" dirty="0">
               <a:solidFill>
@@ -16842,7 +16944,7 @@
               <a:t>        </a:t>
             </a:r>
             <a:r>
-              <a:rPr lang="es-AR" sz="2000" dirty="0" err="1" smtClean="0">
+              <a:rPr lang="es-AR" sz="2000" dirty="0" err="1">
                 <a:solidFill>
                   <a:srgbClr val="000000"/>
                 </a:solidFill>
@@ -16851,7 +16953,7 @@
               <a:t>SC.WriteLine</a:t>
             </a:r>
             <a:r>
-              <a:rPr lang="es-AR" sz="2000" dirty="0" smtClean="0">
+              <a:rPr lang="es-AR" sz="2000" dirty="0">
                 <a:solidFill>
                   <a:srgbClr val="000000"/>
                 </a:solidFill>
@@ -16860,22 +16962,13 @@
               <a:t>(</a:t>
             </a:r>
             <a:r>
-              <a:rPr lang="es-AR" sz="2000" dirty="0" smtClean="0">
+              <a:rPr lang="es-AR" sz="2000" dirty="0">
                 <a:solidFill>
                   <a:srgbClr val="A31515"/>
                 </a:solidFill>
                 <a:latin typeface="Consolas" panose="020B0609020204030204" pitchFamily="49" charset="0"/>
               </a:rPr>
-              <a:t>"</a:t>
-            </a:r>
-            <a:r>
-              <a:rPr lang="es-AR" sz="2000" dirty="0">
-                <a:solidFill>
-                  <a:srgbClr val="A31515"/>
-                </a:solidFill>
-                <a:latin typeface="Consolas" panose="020B0609020204030204" pitchFamily="49" charset="0"/>
-              </a:rPr>
-              <a:t>Hola"</a:t>
+              <a:t>"Hola"</a:t>
             </a:r>
             <a:r>
               <a:rPr lang="es-AR" sz="2000" dirty="0">
@@ -16940,13 +17033,6 @@
   <p:clrMapOvr>
     <a:masterClrMapping/>
   </p:clrMapOvr>
-  <p:timing>
-    <p:tnLst>
-      <p:par>
-        <p:cTn id="1" dur="indefinite" restart="never" nodeType="tmRoot"/>
-      </p:par>
-    </p:tnLst>
-  </p:timing>
 </p:sld>
 </file>
 
@@ -16983,10 +17069,9 @@
           <a:lstStyle/>
           <a:p>
             <a:r>
-              <a:rPr lang="es-AR" dirty="0" smtClean="0"/>
+              <a:rPr lang="es-AR" dirty="0"/>
               <a:t>Métodos (1/2)</a:t>
             </a:r>
-            <a:endParaRPr lang="es-AR" dirty="0"/>
           </a:p>
         </p:txBody>
       </p:sp>
@@ -17390,7 +17475,7 @@
               <a:buNone/>
             </a:pPr>
             <a:r>
-              <a:rPr lang="es-AR" altLang="es-AR" sz="2000" b="1" dirty="0" err="1" smtClean="0">
+              <a:rPr lang="es-AR" altLang="es-AR" sz="2000" b="1" dirty="0" err="1">
                 <a:solidFill>
                   <a:srgbClr val="0000FF"/>
                 </a:solidFill>
@@ -17400,7 +17485,7 @@
               <a:t>namespace</a:t>
             </a:r>
             <a:r>
-              <a:rPr lang="es-AR" altLang="es-AR" sz="2000" b="1" dirty="0" smtClean="0">
+              <a:rPr lang="es-AR" altLang="es-AR" sz="2000" b="1" dirty="0">
                 <a:solidFill>
                   <a:srgbClr val="0000FF"/>
                 </a:solidFill>
@@ -17410,7 +17495,7 @@
               <a:t> </a:t>
             </a:r>
             <a:r>
-              <a:rPr lang="es-AR" altLang="es-AR" sz="2000" b="1" dirty="0" smtClean="0">
+              <a:rPr lang="es-AR" altLang="es-AR" sz="2000" b="1" dirty="0">
                 <a:solidFill>
                   <a:schemeClr val="bg1"/>
                 </a:solidFill>
@@ -17419,13 +17504,6 @@
               </a:rPr>
               <a:t>Identificador</a:t>
             </a:r>
-            <a:endParaRPr lang="es-AR" altLang="es-AR" sz="2000" b="1" dirty="0">
-              <a:solidFill>
-                <a:schemeClr val="bg1"/>
-              </a:solidFill>
-              <a:latin typeface="Arial Narrow" panose="020B0606020202030204" pitchFamily="34" charset="0"/>
-              <a:cs typeface="Times New Roman" panose="02020603050405020304" pitchFamily="18" charset="0"/>
-            </a:endParaRPr>
           </a:p>
           <a:p>
             <a:pPr marL="0" lvl="0" indent="0" defTabSz="914400" fontAlgn="base">
@@ -17486,25 +17564,8 @@
                 <a:latin typeface="Arial Narrow" panose="020B0606020202030204" pitchFamily="34" charset="0"/>
                 <a:cs typeface="Times New Roman" panose="02020603050405020304" pitchFamily="18" charset="0"/>
               </a:rPr>
-              <a:t>// </a:t>
-            </a:r>
-            <a:r>
-              <a:rPr lang="es-AR" altLang="es-AR" sz="2000" b="1" dirty="0" smtClean="0">
-                <a:solidFill>
-                  <a:srgbClr val="66CC66"/>
-                </a:solidFill>
-                <a:latin typeface="Arial Narrow" panose="020B0606020202030204" pitchFamily="34" charset="0"/>
-                <a:cs typeface="Times New Roman" panose="02020603050405020304" pitchFamily="18" charset="0"/>
-              </a:rPr>
-              <a:t>Miembros</a:t>
-            </a:r>
-            <a:endParaRPr lang="es-AR" altLang="es-AR" sz="2000" b="1" dirty="0">
-              <a:solidFill>
-                <a:srgbClr val="66CC66"/>
-              </a:solidFill>
-              <a:latin typeface="Arial Narrow" panose="020B0606020202030204" pitchFamily="34" charset="0"/>
-              <a:cs typeface="Times New Roman" panose="02020603050405020304" pitchFamily="18" charset="0"/>
-            </a:endParaRPr>
+              <a:t>// Miembros</a:t>
+            </a:r>
           </a:p>
           <a:p>
             <a:pPr marL="0" lvl="0" indent="0" defTabSz="914400" fontAlgn="base">
@@ -17567,13 +17628,6 @@
   <p:clrMapOvr>
     <a:masterClrMapping/>
   </p:clrMapOvr>
-  <p:timing>
-    <p:tnLst>
-      <p:par>
-        <p:cTn id="1" dur="indefinite" restart="never" nodeType="tmRoot"/>
-      </p:par>
-    </p:tnLst>
-  </p:timing>
 </p:sld>
 </file>
 
@@ -17610,10 +17664,9 @@
           <a:lstStyle/>
           <a:p>
             <a:r>
-              <a:rPr lang="es-AR" dirty="0" smtClean="0"/>
+              <a:rPr lang="es-AR" dirty="0"/>
               <a:t>Miembros</a:t>
             </a:r>
-            <a:endParaRPr lang="es-AR" dirty="0"/>
           </a:p>
         </p:txBody>
       </p:sp>
@@ -17643,7 +17696,13 @@
                 <a:tableStyleId>{5C22544A-7EE6-4342-B048-85BDC9FD1C3A}</a:tableStyleId>
               </a:tblPr>
               <a:tblGrid>
-                <a:gridCol w="9613900"/>
+                <a:gridCol w="9613900">
+                  <a:extLst>
+                    <a:ext uri="{9D8B030D-6E8A-4147-A177-3AD203B41FA5}">
+                      <a16:colId xmlns:a16="http://schemas.microsoft.com/office/drawing/2014/main" val="20000"/>
+                    </a:ext>
+                  </a:extLst>
+                </a:gridCol>
               </a:tblGrid>
               <a:tr h="370840">
                 <a:tc>
@@ -17670,7 +17729,7 @@
                         <a:tabLst/>
                       </a:pPr>
                       <a:r>
-                        <a:rPr kumimoji="0" lang="es-ES" sz="2400" b="0" i="0" u="none" strike="noStrike" cap="none" normalizeH="0" baseline="0" dirty="0" smtClean="0">
+                        <a:rPr kumimoji="0" lang="es-ES" sz="2400" b="0" i="0" u="none" strike="noStrike" cap="none" normalizeH="0" baseline="0" dirty="0">
                           <a:ln>
                             <a:noFill/>
                           </a:ln>
@@ -17686,6 +17745,11 @@
                   </a:txBody>
                   <a:tcPr marL="90000" marR="90000" marT="46802" marB="46802" horzOverflow="overflow"/>
                 </a:tc>
+                <a:extLst>
+                  <a:ext uri="{0D108BD9-81ED-4DB2-BD59-A6C34878D82A}">
+                    <a16:rowId xmlns:a16="http://schemas.microsoft.com/office/drawing/2014/main" val="10000"/>
+                  </a:ext>
+                </a:extLst>
               </a:tr>
               <a:tr h="370840">
                 <a:tc>
@@ -17712,7 +17776,7 @@
                         <a:tabLst/>
                       </a:pPr>
                       <a:r>
-                        <a:rPr kumimoji="0" lang="es-ES" sz="2400" b="0" i="0" u="none" strike="noStrike" cap="none" normalizeH="0" baseline="0" dirty="0" smtClean="0">
+                        <a:rPr kumimoji="0" lang="es-ES" sz="2400" b="0" i="0" u="none" strike="noStrike" cap="none" normalizeH="0" baseline="0" dirty="0">
                           <a:ln>
                             <a:noFill/>
                           </a:ln>
@@ -17728,6 +17792,11 @@
                   </a:txBody>
                   <a:tcPr marL="90000" marR="90000" marT="46802" marB="46802" horzOverflow="overflow"/>
                 </a:tc>
+                <a:extLst>
+                  <a:ext uri="{0D108BD9-81ED-4DB2-BD59-A6C34878D82A}">
+                    <a16:rowId xmlns:a16="http://schemas.microsoft.com/office/drawing/2014/main" val="10001"/>
+                  </a:ext>
+                </a:extLst>
               </a:tr>
               <a:tr h="370840">
                 <a:tc>
@@ -17754,7 +17823,7 @@
                         <a:tabLst/>
                       </a:pPr>
                       <a:r>
-                        <a:rPr kumimoji="0" lang="es-ES" sz="2400" b="0" i="0" u="none" strike="noStrike" cap="none" normalizeH="0" baseline="0" dirty="0" smtClean="0">
+                        <a:rPr kumimoji="0" lang="es-ES" sz="2400" b="0" i="0" u="none" strike="noStrike" cap="none" normalizeH="0" baseline="0" dirty="0">
                           <a:ln>
                             <a:noFill/>
                           </a:ln>
@@ -17770,6 +17839,11 @@
                   </a:txBody>
                   <a:tcPr marL="90000" marR="90000" marT="46802" marB="46802" horzOverflow="overflow"/>
                 </a:tc>
+                <a:extLst>
+                  <a:ext uri="{0D108BD9-81ED-4DB2-BD59-A6C34878D82A}">
+                    <a16:rowId xmlns:a16="http://schemas.microsoft.com/office/drawing/2014/main" val="10002"/>
+                  </a:ext>
+                </a:extLst>
               </a:tr>
               <a:tr h="370840">
                 <a:tc>
@@ -17796,7 +17870,7 @@
                         <a:tabLst/>
                       </a:pPr>
                       <a:r>
-                        <a:rPr kumimoji="0" lang="es-ES" sz="2400" b="0" i="0" u="none" strike="noStrike" cap="none" normalizeH="0" baseline="0" dirty="0" smtClean="0">
+                        <a:rPr kumimoji="0" lang="es-ES" sz="2400" b="0" i="0" u="none" strike="noStrike" cap="none" normalizeH="0" baseline="0" dirty="0">
                           <a:ln>
                             <a:noFill/>
                           </a:ln>
@@ -17812,6 +17886,11 @@
                   </a:txBody>
                   <a:tcPr marL="90000" marR="90000" marT="46802" marB="46802" horzOverflow="overflow"/>
                 </a:tc>
+                <a:extLst>
+                  <a:ext uri="{0D108BD9-81ED-4DB2-BD59-A6C34878D82A}">
+                    <a16:rowId xmlns:a16="http://schemas.microsoft.com/office/drawing/2014/main" val="10003"/>
+                  </a:ext>
+                </a:extLst>
               </a:tr>
               <a:tr h="370840">
                 <a:tc>
@@ -17838,7 +17917,7 @@
                         <a:tabLst/>
                       </a:pPr>
                       <a:r>
-                        <a:rPr kumimoji="0" lang="es-ES" sz="2400" b="0" i="0" u="none" strike="noStrike" cap="none" normalizeH="0" baseline="0" dirty="0" smtClean="0">
+                        <a:rPr kumimoji="0" lang="es-ES" sz="2400" b="0" i="0" u="none" strike="noStrike" cap="none" normalizeH="0" baseline="0" dirty="0">
                           <a:ln>
                             <a:noFill/>
                           </a:ln>
@@ -17854,6 +17933,11 @@
                   </a:txBody>
                   <a:tcPr marL="90000" marR="90000" marT="46802" marB="46802" horzOverflow="overflow"/>
                 </a:tc>
+                <a:extLst>
+                  <a:ext uri="{0D108BD9-81ED-4DB2-BD59-A6C34878D82A}">
+                    <a16:rowId xmlns:a16="http://schemas.microsoft.com/office/drawing/2014/main" val="10004"/>
+                  </a:ext>
+                </a:extLst>
               </a:tr>
               <a:tr h="370840">
                 <a:tc>
@@ -17880,7 +17964,7 @@
                         <a:tabLst/>
                       </a:pPr>
                       <a:r>
-                        <a:rPr kumimoji="0" lang="es-ES" sz="2400" b="0" i="0" u="none" strike="noStrike" cap="none" normalizeH="0" baseline="0" dirty="0" smtClean="0">
+                        <a:rPr kumimoji="0" lang="es-ES" sz="2400" b="0" i="0" u="none" strike="noStrike" cap="none" normalizeH="0" baseline="0" dirty="0">
                           <a:ln>
                             <a:noFill/>
                           </a:ln>
@@ -17896,6 +17980,11 @@
                   </a:txBody>
                   <a:tcPr marL="90000" marR="90000" marT="46802" marB="46802" horzOverflow="overflow"/>
                 </a:tc>
+                <a:extLst>
+                  <a:ext uri="{0D108BD9-81ED-4DB2-BD59-A6C34878D82A}">
+                    <a16:rowId xmlns:a16="http://schemas.microsoft.com/office/drawing/2014/main" val="10005"/>
+                  </a:ext>
+                </a:extLst>
               </a:tr>
               <a:tr h="370840">
                 <a:tc>
@@ -17922,7 +18011,7 @@
                         <a:tabLst/>
                       </a:pPr>
                       <a:r>
-                        <a:rPr kumimoji="0" lang="es-ES" sz="2400" b="0" i="0" u="none" strike="noStrike" cap="none" normalizeH="0" baseline="0" dirty="0" smtClean="0">
+                        <a:rPr kumimoji="0" lang="es-ES" sz="2400" b="0" i="0" u="none" strike="noStrike" cap="none" normalizeH="0" baseline="0" dirty="0">
                           <a:ln>
                             <a:noFill/>
                           </a:ln>
@@ -17938,6 +18027,11 @@
                   </a:txBody>
                   <a:tcPr marL="90000" marR="90000" marT="46802" marB="46802" horzOverflow="overflow"/>
                 </a:tc>
+                <a:extLst>
+                  <a:ext uri="{0D108BD9-81ED-4DB2-BD59-A6C34878D82A}">
+                    <a16:rowId xmlns:a16="http://schemas.microsoft.com/office/drawing/2014/main" val="10006"/>
+                  </a:ext>
+                </a:extLst>
               </a:tr>
               <a:tr h="370840">
                 <a:tc>
@@ -17964,7 +18058,7 @@
                         <a:tabLst/>
                       </a:pPr>
                       <a:r>
-                        <a:rPr kumimoji="0" lang="es-ES" sz="2400" b="0" i="0" u="none" strike="noStrike" cap="none" normalizeH="0" baseline="0" dirty="0" smtClean="0">
+                        <a:rPr kumimoji="0" lang="es-ES" sz="2400" b="0" i="0" u="none" strike="noStrike" cap="none" normalizeH="0" baseline="0" dirty="0">
                           <a:ln>
                             <a:noFill/>
                           </a:ln>
@@ -17980,6 +18074,11 @@
                   </a:txBody>
                   <a:tcPr marL="90000" marR="90000" marT="46802" marB="46802" horzOverflow="overflow"/>
                 </a:tc>
+                <a:extLst>
+                  <a:ext uri="{0D108BD9-81ED-4DB2-BD59-A6C34878D82A}">
+                    <a16:rowId xmlns:a16="http://schemas.microsoft.com/office/drawing/2014/main" val="10007"/>
+                  </a:ext>
+                </a:extLst>
               </a:tr>
               <a:tr h="370840">
                 <a:tc>
@@ -18006,7 +18105,7 @@
                         <a:tabLst/>
                       </a:pPr>
                       <a:r>
-                        <a:rPr kumimoji="0" lang="es-ES" sz="2400" b="0" i="0" u="none" strike="noStrike" cap="none" normalizeH="0" baseline="0" dirty="0" smtClean="0">
+                        <a:rPr kumimoji="0" lang="es-ES" sz="2400" b="0" i="0" u="none" strike="noStrike" cap="none" normalizeH="0" baseline="0" dirty="0">
                           <a:ln>
                             <a:noFill/>
                           </a:ln>
@@ -18022,6 +18121,11 @@
                   </a:txBody>
                   <a:tcPr marL="90000" marR="90000" marT="46802" marB="46802" horzOverflow="overflow"/>
                 </a:tc>
+                <a:extLst>
+                  <a:ext uri="{0D108BD9-81ED-4DB2-BD59-A6C34878D82A}">
+                    <a16:rowId xmlns:a16="http://schemas.microsoft.com/office/drawing/2014/main" val="10008"/>
+                  </a:ext>
+                </a:extLst>
               </a:tr>
             </a:tbl>
           </a:graphicData>
@@ -18176,7 +18280,7 @@
           <a:p>
             <a:pPr algn="ctr"/>
             <a:r>
-              <a:rPr lang="es-AR" sz="4000" b="1" dirty="0" smtClean="0">
+              <a:rPr lang="es-AR" sz="4000" b="1" dirty="0">
                 <a:effectLst>
                   <a:outerShdw blurRad="38100" dist="38100" dir="2700000" algn="tl">
                     <a:srgbClr val="000000">
@@ -18187,15 +18291,6 @@
               </a:rPr>
               <a:t>PILARES</a:t>
             </a:r>
-            <a:endParaRPr lang="es-AR" sz="4000" b="1" dirty="0">
-              <a:effectLst>
-                <a:outerShdw blurRad="38100" dist="38100" dir="2700000" algn="tl">
-                  <a:srgbClr val="000000">
-                    <a:alpha val="43137"/>
-                  </a:srgbClr>
-                </a:outerShdw>
-              </a:effectLst>
-            </a:endParaRPr>
           </a:p>
         </p:txBody>
       </p:sp>
@@ -18236,7 +18331,7 @@
           <a:p>
             <a:pPr algn="ctr"/>
             <a:r>
-              <a:rPr lang="es-AR" b="1" dirty="0" smtClean="0">
+              <a:rPr lang="es-AR" b="1" dirty="0">
                 <a:effectLst>
                   <a:outerShdw blurRad="38100" dist="38100" dir="2700000" algn="tl">
                     <a:srgbClr val="000000">
@@ -18247,15 +18342,6 @@
               </a:rPr>
               <a:t>ABSTRACCIÓN</a:t>
             </a:r>
-            <a:endParaRPr lang="es-AR" b="1" dirty="0">
-              <a:effectLst>
-                <a:outerShdw blurRad="38100" dist="38100" dir="2700000" algn="tl">
-                  <a:srgbClr val="000000">
-                    <a:alpha val="43137"/>
-                  </a:srgbClr>
-                </a:outerShdw>
-              </a:effectLst>
-            </a:endParaRPr>
           </a:p>
         </p:txBody>
       </p:sp>
@@ -18296,7 +18382,7 @@
           <a:p>
             <a:pPr algn="ctr"/>
             <a:r>
-              <a:rPr lang="es-AR" b="1" dirty="0" smtClean="0">
+              <a:rPr lang="es-AR" b="1" dirty="0">
                 <a:effectLst>
                   <a:outerShdw blurRad="38100" dist="38100" dir="2700000" algn="tl">
                     <a:srgbClr val="000000">
@@ -18307,15 +18393,6 @@
               </a:rPr>
               <a:t>ENCAPSULAMIENTO</a:t>
             </a:r>
-            <a:endParaRPr lang="es-AR" b="1" dirty="0">
-              <a:effectLst>
-                <a:outerShdw blurRad="38100" dist="38100" dir="2700000" algn="tl">
-                  <a:srgbClr val="000000">
-                    <a:alpha val="43137"/>
-                  </a:srgbClr>
-                </a:outerShdw>
-              </a:effectLst>
-            </a:endParaRPr>
           </a:p>
         </p:txBody>
       </p:sp>
@@ -18356,7 +18433,7 @@
           <a:p>
             <a:pPr algn="ctr"/>
             <a:r>
-              <a:rPr lang="es-AR" b="1" dirty="0" smtClean="0">
+              <a:rPr lang="es-AR" b="1" dirty="0">
                 <a:effectLst>
                   <a:outerShdw blurRad="38100" dist="38100" dir="2700000" algn="tl">
                     <a:srgbClr val="000000">
@@ -18367,15 +18444,6 @@
               </a:rPr>
               <a:t>HERENCIA</a:t>
             </a:r>
-            <a:endParaRPr lang="es-AR" b="1" dirty="0">
-              <a:effectLst>
-                <a:outerShdw blurRad="38100" dist="38100" dir="2700000" algn="tl">
-                  <a:srgbClr val="000000">
-                    <a:alpha val="43137"/>
-                  </a:srgbClr>
-                </a:outerShdw>
-              </a:effectLst>
-            </a:endParaRPr>
           </a:p>
         </p:txBody>
       </p:sp>
@@ -18416,7 +18484,7 @@
           <a:p>
             <a:pPr algn="ctr"/>
             <a:r>
-              <a:rPr lang="es-AR" b="1" dirty="0" smtClean="0">
+              <a:rPr lang="es-AR" b="1" dirty="0">
                 <a:effectLst>
                   <a:outerShdw blurRad="38100" dist="38100" dir="2700000" algn="tl">
                     <a:srgbClr val="000000">
@@ -18427,15 +18495,6 @@
               </a:rPr>
               <a:t>POLIMORFISMO</a:t>
             </a:r>
-            <a:endParaRPr lang="es-AR" b="1" dirty="0">
-              <a:effectLst>
-                <a:outerShdw blurRad="38100" dist="38100" dir="2700000" algn="tl">
-                  <a:srgbClr val="000000">
-                    <a:alpha val="43137"/>
-                  </a:srgbClr>
-                </a:outerShdw>
-              </a:effectLst>
-            </a:endParaRPr>
           </a:p>
         </p:txBody>
       </p:sp>
@@ -18693,10 +18752,9 @@
           <a:lstStyle/>
           <a:p>
             <a:r>
-              <a:rPr lang="es-AR" dirty="0" smtClean="0"/>
+              <a:rPr lang="es-AR" dirty="0"/>
               <a:t>Abstracción</a:t>
             </a:r>
-            <a:endParaRPr lang="es-AR" dirty="0"/>
           </a:p>
         </p:txBody>
       </p:sp>
@@ -18886,13 +18944,6 @@
   <p:clrMapOvr>
     <a:masterClrMapping/>
   </p:clrMapOvr>
-  <p:timing>
-    <p:tnLst>
-      <p:par>
-        <p:cTn id="1" dur="indefinite" restart="never" nodeType="tmRoot"/>
-      </p:par>
-    </p:tnLst>
-  </p:timing>
 </p:sld>
 </file>
 
@@ -19070,13 +19121,6 @@
   <p:clrMapOvr>
     <a:masterClrMapping/>
   </p:clrMapOvr>
-  <p:timing>
-    <p:tnLst>
-      <p:par>
-        <p:cTn id="1" dur="indefinite" restart="never" nodeType="tmRoot"/>
-      </p:par>
-    </p:tnLst>
-  </p:timing>
 </p:sld>
 </file>
 
@@ -19145,19 +19189,6 @@
               <a:defRPr/>
             </a:pPr>
             <a:r>
-              <a:rPr lang="es-CR" sz="2800" dirty="0" smtClean="0">
-                <a:effectLst>
-                  <a:outerShdw blurRad="38100" dist="38100" dir="2700000" algn="tl">
-                    <a:srgbClr val="000000">
-                      <a:alpha val="43137"/>
-                    </a:srgbClr>
-                  </a:outerShdw>
-                </a:effectLst>
-                <a:latin typeface="Franklin Gothic Medium" panose="020B0603020102020204" pitchFamily="34" charset="0"/>
-              </a:rPr>
-              <a:t>La relación entre clases es del tipo “es un </a:t>
-            </a:r>
-            <a:r>
               <a:rPr lang="es-CR" sz="2800" dirty="0">
                 <a:effectLst>
                   <a:outerShdw blurRad="38100" dist="38100" dir="2700000" algn="tl">
@@ -19168,21 +19199,13 @@
                 </a:effectLst>
                 <a:latin typeface="Franklin Gothic Medium" panose="020B0603020102020204" pitchFamily="34" charset="0"/>
               </a:rPr>
-              <a:t>tipo de</a:t>
-            </a:r>
-            <a:r>
-              <a:rPr lang="es-CR" sz="2800" dirty="0" smtClean="0">
-                <a:effectLst>
-                  <a:outerShdw blurRad="38100" dist="38100" dir="2700000" algn="tl">
-                    <a:srgbClr val="000000">
-                      <a:alpha val="43137"/>
-                    </a:srgbClr>
-                  </a:outerShdw>
-                </a:effectLst>
-                <a:latin typeface="Franklin Gothic Medium" panose="020B0603020102020204" pitchFamily="34" charset="0"/>
-              </a:rPr>
-              <a:t>”.</a:t>
-            </a:r>
+              <a:t>La relación entre clases es del tipo “es un tipo de”.</a:t>
+            </a:r>
+          </a:p>
+          <a:p>
+            <a:pPr>
+              <a:defRPr/>
+            </a:pPr>
             <a:endParaRPr lang="es-CR" sz="2800" dirty="0">
               <a:effectLst>
                 <a:outerShdw blurRad="38100" dist="38100" dir="2700000" algn="tl">
@@ -19198,34 +19221,6 @@
             <a:pPr>
               <a:defRPr/>
             </a:pPr>
-            <a:endParaRPr lang="es-CR" sz="2800" dirty="0" smtClean="0">
-              <a:effectLst>
-                <a:outerShdw blurRad="38100" dist="38100" dir="2700000" algn="tl">
-                  <a:srgbClr val="000000">
-                    <a:alpha val="43137"/>
-                  </a:srgbClr>
-                </a:outerShdw>
-              </a:effectLst>
-              <a:latin typeface="Franklin Gothic Medium" panose="020B0603020102020204" pitchFamily="34" charset="0"/>
-            </a:endParaRPr>
-          </a:p>
-          <a:p>
-            <a:pPr>
-              <a:defRPr/>
-            </a:pPr>
-            <a:r>
-              <a:rPr lang="es-CR" sz="2800" dirty="0" smtClean="0">
-                <a:effectLst>
-                  <a:outerShdw blurRad="38100" dist="38100" dir="2700000" algn="tl">
-                    <a:srgbClr val="000000">
-                      <a:alpha val="43137"/>
-                    </a:srgbClr>
-                  </a:outerShdw>
-                </a:effectLst>
-                <a:latin typeface="Franklin Gothic Medium" panose="020B0603020102020204" pitchFamily="34" charset="0"/>
-              </a:rPr>
-              <a:t>Va </a:t>
-            </a:r>
             <a:r>
               <a:rPr lang="es-CR" sz="2800" dirty="0">
                 <a:effectLst>
@@ -19237,33 +19232,7 @@
                 </a:effectLst>
                 <a:latin typeface="Franklin Gothic Medium" panose="020B0603020102020204" pitchFamily="34" charset="0"/>
               </a:rPr>
-              <a:t>de la generalización a la </a:t>
-            </a:r>
-            <a:r>
-              <a:rPr lang="es-CR" sz="2800" dirty="0" smtClean="0">
-                <a:effectLst>
-                  <a:outerShdw blurRad="38100" dist="38100" dir="2700000" algn="tl">
-                    <a:srgbClr val="000000">
-                      <a:alpha val="43137"/>
-                    </a:srgbClr>
-                  </a:outerShdw>
-                </a:effectLst>
-                <a:latin typeface="Franklin Gothic Medium" panose="020B0603020102020204" pitchFamily="34" charset="0"/>
-              </a:rPr>
-              <a:t>especialización</a:t>
-            </a:r>
-            <a:r>
-              <a:rPr lang="es-CR" sz="2800" dirty="0">
-                <a:effectLst>
-                  <a:outerShdw blurRad="38100" dist="38100" dir="2700000" algn="tl">
-                    <a:srgbClr val="000000">
-                      <a:alpha val="43137"/>
-                    </a:srgbClr>
-                  </a:outerShdw>
-                </a:effectLst>
-                <a:latin typeface="Franklin Gothic Medium" panose="020B0603020102020204" pitchFamily="34" charset="0"/>
-              </a:rPr>
-              <a:t>.</a:t>
+              <a:t>Va de la generalización a la especialización.</a:t>
             </a:r>
           </a:p>
           <a:p>
@@ -19398,7 +19367,13 @@
                 <a:tableStyleId>{5C22544A-7EE6-4342-B048-85BDC9FD1C3A}</a:tableStyleId>
               </a:tblPr>
               <a:tblGrid>
-                <a:gridCol w="3081020"/>
+                <a:gridCol w="3081020">
+                  <a:extLst>
+                    <a:ext uri="{9D8B030D-6E8A-4147-A177-3AD203B41FA5}">
+                      <a16:colId xmlns:a16="http://schemas.microsoft.com/office/drawing/2014/main" val="20000"/>
+                    </a:ext>
+                  </a:extLst>
+                </a:gridCol>
               </a:tblGrid>
               <a:tr h="370840">
                 <a:tc>
@@ -19407,14 +19382,18 @@
                     <a:lstStyle/>
                     <a:p>
                       <a:r>
-                        <a:rPr lang="es-AR" dirty="0" smtClean="0"/>
+                        <a:rPr lang="es-AR" dirty="0"/>
                         <a:t>Figura</a:t>
                       </a:r>
-                      <a:endParaRPr lang="es-AR" dirty="0"/>
                     </a:p>
                   </a:txBody>
                   <a:tcPr/>
                 </a:tc>
+                <a:extLst>
+                  <a:ext uri="{0D108BD9-81ED-4DB2-BD59-A6C34878D82A}">
+                    <a16:rowId xmlns:a16="http://schemas.microsoft.com/office/drawing/2014/main" val="10000"/>
+                  </a:ext>
+                </a:extLst>
               </a:tr>
               <a:tr h="370840">
                 <a:tc>
@@ -19423,15 +19402,15 @@
                     <a:lstStyle/>
                     <a:p>
                       <a:r>
-                        <a:rPr lang="es-AR" dirty="0" err="1" smtClean="0"/>
+                        <a:rPr lang="es-AR" dirty="0" err="1"/>
                         <a:t>area</a:t>
                       </a:r>
                       <a:r>
-                        <a:rPr lang="es-AR" dirty="0" smtClean="0"/>
+                        <a:rPr lang="es-AR" dirty="0"/>
                         <a:t>() : </a:t>
                       </a:r>
                       <a:r>
-                        <a:rPr lang="es-AR" dirty="0" err="1" smtClean="0"/>
+                        <a:rPr lang="es-AR" dirty="0" err="1"/>
                         <a:t>void</a:t>
                       </a:r>
                       <a:endParaRPr lang="es-AR" dirty="0"/>
@@ -19439,6 +19418,11 @@
                   </a:txBody>
                   <a:tcPr/>
                 </a:tc>
+                <a:extLst>
+                  <a:ext uri="{0D108BD9-81ED-4DB2-BD59-A6C34878D82A}">
+                    <a16:rowId xmlns:a16="http://schemas.microsoft.com/office/drawing/2014/main" val="10001"/>
+                  </a:ext>
+                </a:extLst>
               </a:tr>
               <a:tr h="370840">
                 <a:tc>
@@ -19447,15 +19431,15 @@
                     <a:lstStyle/>
                     <a:p>
                       <a:r>
-                        <a:rPr lang="es-AR" dirty="0" err="1" smtClean="0"/>
+                        <a:rPr lang="es-AR" dirty="0" err="1"/>
                         <a:t>perimetro</a:t>
                       </a:r>
                       <a:r>
-                        <a:rPr lang="es-AR" dirty="0" smtClean="0"/>
+                        <a:rPr lang="es-AR" dirty="0"/>
                         <a:t>() : </a:t>
                       </a:r>
                       <a:r>
-                        <a:rPr lang="es-AR" dirty="0" err="1" smtClean="0"/>
+                        <a:rPr lang="es-AR" dirty="0" err="1"/>
                         <a:t>void</a:t>
                       </a:r>
                       <a:endParaRPr lang="es-AR" dirty="0"/>
@@ -19463,6 +19447,11 @@
                   </a:txBody>
                   <a:tcPr/>
                 </a:tc>
+                <a:extLst>
+                  <a:ext uri="{0D108BD9-81ED-4DB2-BD59-A6C34878D82A}">
+                    <a16:rowId xmlns:a16="http://schemas.microsoft.com/office/drawing/2014/main" val="10002"/>
+                  </a:ext>
+                </a:extLst>
               </a:tr>
             </a:tbl>
           </a:graphicData>
@@ -19493,7 +19482,13 @@
                 <a:tableStyleId>{5C22544A-7EE6-4342-B048-85BDC9FD1C3A}</a:tableStyleId>
               </a:tblPr>
               <a:tblGrid>
-                <a:gridCol w="3086101"/>
+                <a:gridCol w="3086101">
+                  <a:extLst>
+                    <a:ext uri="{9D8B030D-6E8A-4147-A177-3AD203B41FA5}">
+                      <a16:colId xmlns:a16="http://schemas.microsoft.com/office/drawing/2014/main" val="20000"/>
+                    </a:ext>
+                  </a:extLst>
+                </a:gridCol>
               </a:tblGrid>
               <a:tr h="370840">
                 <a:tc>
@@ -19502,14 +19497,18 @@
                     <a:lstStyle/>
                     <a:p>
                       <a:r>
-                        <a:rPr lang="es-AR" dirty="0" smtClean="0"/>
+                        <a:rPr lang="es-AR" dirty="0"/>
                         <a:t>Círculo</a:t>
                       </a:r>
-                      <a:endParaRPr lang="es-AR" dirty="0"/>
                     </a:p>
                   </a:txBody>
                   <a:tcPr/>
                 </a:tc>
+                <a:extLst>
+                  <a:ext uri="{0D108BD9-81ED-4DB2-BD59-A6C34878D82A}">
+                    <a16:rowId xmlns:a16="http://schemas.microsoft.com/office/drawing/2014/main" val="10000"/>
+                  </a:ext>
+                </a:extLst>
               </a:tr>
               <a:tr h="370840">
                 <a:tc>
@@ -19522,6 +19521,11 @@
                   </a:txBody>
                   <a:tcPr/>
                 </a:tc>
+                <a:extLst>
+                  <a:ext uri="{0D108BD9-81ED-4DB2-BD59-A6C34878D82A}">
+                    <a16:rowId xmlns:a16="http://schemas.microsoft.com/office/drawing/2014/main" val="10001"/>
+                  </a:ext>
+                </a:extLst>
               </a:tr>
             </a:tbl>
           </a:graphicData>
@@ -19586,10 +19590,9 @@
           <a:lstStyle/>
           <a:p>
             <a:r>
-              <a:rPr lang="es-AR" dirty="0" smtClean="0"/>
+              <a:rPr lang="es-AR" dirty="0"/>
               <a:t>“Es un tipo de”</a:t>
             </a:r>
-            <a:endParaRPr lang="es-AR" dirty="0"/>
           </a:p>
         </p:txBody>
       </p:sp>
@@ -19603,14 +19606,6 @@
   <p:clrMapOvr>
     <a:masterClrMapping/>
   </p:clrMapOvr>
-  <mc:AlternateContent xmlns:mc="http://schemas.openxmlformats.org/markup-compatibility/2006" xmlns:p14="http://schemas.microsoft.com/office/powerpoint/2010/main">
-    <mc:Choice Requires="p14">
-      <p:transition p14:dur="0"/>
-    </mc:Choice>
-    <mc:Fallback xmlns="">
-      <p:transition/>
-    </mc:Fallback>
-  </mc:AlternateContent>
   <p:timing>
     <p:tnLst>
       <p:par>
@@ -20119,7 +20114,13 @@
                 <a:tableStyleId>{5C22544A-7EE6-4342-B048-85BDC9FD1C3A}</a:tableStyleId>
               </a:tblPr>
               <a:tblGrid>
-                <a:gridCol w="3081020"/>
+                <a:gridCol w="3081020">
+                  <a:extLst>
+                    <a:ext uri="{9D8B030D-6E8A-4147-A177-3AD203B41FA5}">
+                      <a16:colId xmlns:a16="http://schemas.microsoft.com/office/drawing/2014/main" val="20000"/>
+                    </a:ext>
+                  </a:extLst>
+                </a:gridCol>
               </a:tblGrid>
               <a:tr h="370840">
                 <a:tc>
@@ -20128,14 +20129,18 @@
                     <a:lstStyle/>
                     <a:p>
                       <a:r>
-                        <a:rPr lang="es-AR" dirty="0" smtClean="0"/>
+                        <a:rPr lang="es-AR" dirty="0"/>
                         <a:t>Figura</a:t>
                       </a:r>
-                      <a:endParaRPr lang="es-AR" dirty="0"/>
                     </a:p>
                   </a:txBody>
                   <a:tcPr/>
                 </a:tc>
+                <a:extLst>
+                  <a:ext uri="{0D108BD9-81ED-4DB2-BD59-A6C34878D82A}">
+                    <a16:rowId xmlns:a16="http://schemas.microsoft.com/office/drawing/2014/main" val="10000"/>
+                  </a:ext>
+                </a:extLst>
               </a:tr>
               <a:tr h="370840">
                 <a:tc>
@@ -20144,15 +20149,15 @@
                     <a:lstStyle/>
                     <a:p>
                       <a:r>
-                        <a:rPr lang="es-AR" dirty="0" err="1" smtClean="0"/>
+                        <a:rPr lang="es-AR" dirty="0" err="1"/>
                         <a:t>area</a:t>
                       </a:r>
                       <a:r>
-                        <a:rPr lang="es-AR" dirty="0" smtClean="0"/>
+                        <a:rPr lang="es-AR" dirty="0"/>
                         <a:t>() : </a:t>
                       </a:r>
                       <a:r>
-                        <a:rPr lang="es-AR" dirty="0" err="1" smtClean="0"/>
+                        <a:rPr lang="es-AR" dirty="0" err="1"/>
                         <a:t>void</a:t>
                       </a:r>
                       <a:endParaRPr lang="es-AR" dirty="0"/>
@@ -20160,6 +20165,11 @@
                   </a:txBody>
                   <a:tcPr/>
                 </a:tc>
+                <a:extLst>
+                  <a:ext uri="{0D108BD9-81ED-4DB2-BD59-A6C34878D82A}">
+                    <a16:rowId xmlns:a16="http://schemas.microsoft.com/office/drawing/2014/main" val="10001"/>
+                  </a:ext>
+                </a:extLst>
               </a:tr>
               <a:tr h="370840">
                 <a:tc>
@@ -20168,15 +20178,15 @@
                     <a:lstStyle/>
                     <a:p>
                       <a:r>
-                        <a:rPr lang="es-AR" dirty="0" err="1" smtClean="0"/>
+                        <a:rPr lang="es-AR" dirty="0" err="1"/>
                         <a:t>perimetro</a:t>
                       </a:r>
                       <a:r>
-                        <a:rPr lang="es-AR" dirty="0" smtClean="0"/>
+                        <a:rPr lang="es-AR" dirty="0"/>
                         <a:t>() : </a:t>
                       </a:r>
                       <a:r>
-                        <a:rPr lang="es-AR" dirty="0" err="1" smtClean="0"/>
+                        <a:rPr lang="es-AR" dirty="0" err="1"/>
                         <a:t>void</a:t>
                       </a:r>
                       <a:endParaRPr lang="es-AR" dirty="0"/>
@@ -20184,6 +20194,11 @@
                   </a:txBody>
                   <a:tcPr/>
                 </a:tc>
+                <a:extLst>
+                  <a:ext uri="{0D108BD9-81ED-4DB2-BD59-A6C34878D82A}">
+                    <a16:rowId xmlns:a16="http://schemas.microsoft.com/office/drawing/2014/main" val="10002"/>
+                  </a:ext>
+                </a:extLst>
               </a:tr>
             </a:tbl>
           </a:graphicData>
@@ -20214,7 +20229,13 @@
                 <a:tableStyleId>{5C22544A-7EE6-4342-B048-85BDC9FD1C3A}</a:tableStyleId>
               </a:tblPr>
               <a:tblGrid>
-                <a:gridCol w="3081020"/>
+                <a:gridCol w="3081020">
+                  <a:extLst>
+                    <a:ext uri="{9D8B030D-6E8A-4147-A177-3AD203B41FA5}">
+                      <a16:colId xmlns:a16="http://schemas.microsoft.com/office/drawing/2014/main" val="20000"/>
+                    </a:ext>
+                  </a:extLst>
+                </a:gridCol>
               </a:tblGrid>
               <a:tr h="370840">
                 <a:tc>
@@ -20223,14 +20244,18 @@
                     <a:lstStyle/>
                     <a:p>
                       <a:r>
-                        <a:rPr lang="es-AR" dirty="0" smtClean="0"/>
+                        <a:rPr lang="es-AR" dirty="0"/>
                         <a:t>Círculo</a:t>
                       </a:r>
-                      <a:endParaRPr lang="es-AR" dirty="0"/>
                     </a:p>
                   </a:txBody>
                   <a:tcPr/>
                 </a:tc>
+                <a:extLst>
+                  <a:ext uri="{0D108BD9-81ED-4DB2-BD59-A6C34878D82A}">
+                    <a16:rowId xmlns:a16="http://schemas.microsoft.com/office/drawing/2014/main" val="10000"/>
+                  </a:ext>
+                </a:extLst>
               </a:tr>
               <a:tr h="370840">
                 <a:tc>
@@ -20239,15 +20264,15 @@
                     <a:lstStyle/>
                     <a:p>
                       <a:r>
-                        <a:rPr lang="es-AR" dirty="0" err="1" smtClean="0"/>
+                        <a:rPr lang="es-AR" dirty="0" err="1"/>
                         <a:t>area</a:t>
                       </a:r>
                       <a:r>
-                        <a:rPr lang="es-AR" dirty="0" smtClean="0"/>
+                        <a:rPr lang="es-AR" dirty="0"/>
                         <a:t>() : </a:t>
                       </a:r>
                       <a:r>
-                        <a:rPr lang="es-AR" dirty="0" err="1" smtClean="0"/>
+                        <a:rPr lang="es-AR" dirty="0" err="1"/>
                         <a:t>void</a:t>
                       </a:r>
                       <a:endParaRPr lang="es-AR" dirty="0"/>
@@ -20255,6 +20280,11 @@
                   </a:txBody>
                   <a:tcPr/>
                 </a:tc>
+                <a:extLst>
+                  <a:ext uri="{0D108BD9-81ED-4DB2-BD59-A6C34878D82A}">
+                    <a16:rowId xmlns:a16="http://schemas.microsoft.com/office/drawing/2014/main" val="10001"/>
+                  </a:ext>
+                </a:extLst>
               </a:tr>
               <a:tr h="370840">
                 <a:tc>
@@ -20263,15 +20293,15 @@
                     <a:lstStyle/>
                     <a:p>
                       <a:r>
-                        <a:rPr lang="es-AR" dirty="0" err="1" smtClean="0"/>
+                        <a:rPr lang="es-AR" dirty="0" err="1"/>
                         <a:t>perimetro</a:t>
                       </a:r>
                       <a:r>
-                        <a:rPr lang="es-AR" dirty="0" smtClean="0"/>
+                        <a:rPr lang="es-AR" dirty="0"/>
                         <a:t>() : </a:t>
                       </a:r>
                       <a:r>
-                        <a:rPr lang="es-AR" dirty="0" err="1" smtClean="0"/>
+                        <a:rPr lang="es-AR" dirty="0" err="1"/>
                         <a:t>void</a:t>
                       </a:r>
                       <a:endParaRPr lang="es-AR" dirty="0"/>
@@ -20279,6 +20309,11 @@
                   </a:txBody>
                   <a:tcPr/>
                 </a:tc>
+                <a:extLst>
+                  <a:ext uri="{0D108BD9-81ED-4DB2-BD59-A6C34878D82A}">
+                    <a16:rowId xmlns:a16="http://schemas.microsoft.com/office/drawing/2014/main" val="10002"/>
+                  </a:ext>
+                </a:extLst>
               </a:tr>
             </a:tbl>
           </a:graphicData>
@@ -20309,7 +20344,13 @@
                 <a:tableStyleId>{5C22544A-7EE6-4342-B048-85BDC9FD1C3A}</a:tableStyleId>
               </a:tblPr>
               <a:tblGrid>
-                <a:gridCol w="3081020"/>
+                <a:gridCol w="3081020">
+                  <a:extLst>
+                    <a:ext uri="{9D8B030D-6E8A-4147-A177-3AD203B41FA5}">
+                      <a16:colId xmlns:a16="http://schemas.microsoft.com/office/drawing/2014/main" val="20000"/>
+                    </a:ext>
+                  </a:extLst>
+                </a:gridCol>
               </a:tblGrid>
               <a:tr h="370840">
                 <a:tc>
@@ -20318,14 +20359,18 @@
                     <a:lstStyle/>
                     <a:p>
                       <a:r>
-                        <a:rPr lang="es-AR" dirty="0" smtClean="0"/>
+                        <a:rPr lang="es-AR" dirty="0"/>
                         <a:t>Cuadrado</a:t>
                       </a:r>
-                      <a:endParaRPr lang="es-AR" dirty="0"/>
                     </a:p>
                   </a:txBody>
                   <a:tcPr/>
                 </a:tc>
+                <a:extLst>
+                  <a:ext uri="{0D108BD9-81ED-4DB2-BD59-A6C34878D82A}">
+                    <a16:rowId xmlns:a16="http://schemas.microsoft.com/office/drawing/2014/main" val="10000"/>
+                  </a:ext>
+                </a:extLst>
               </a:tr>
               <a:tr h="370840">
                 <a:tc>
@@ -20334,15 +20379,15 @@
                     <a:lstStyle/>
                     <a:p>
                       <a:r>
-                        <a:rPr lang="es-AR" dirty="0" err="1" smtClean="0"/>
+                        <a:rPr lang="es-AR" dirty="0" err="1"/>
                         <a:t>area</a:t>
                       </a:r>
                       <a:r>
-                        <a:rPr lang="es-AR" dirty="0" smtClean="0"/>
+                        <a:rPr lang="es-AR" dirty="0"/>
                         <a:t>() : </a:t>
                       </a:r>
                       <a:r>
-                        <a:rPr lang="es-AR" dirty="0" err="1" smtClean="0"/>
+                        <a:rPr lang="es-AR" dirty="0" err="1"/>
                         <a:t>void</a:t>
                       </a:r>
                       <a:endParaRPr lang="es-AR" dirty="0"/>
@@ -20350,6 +20395,11 @@
                   </a:txBody>
                   <a:tcPr/>
                 </a:tc>
+                <a:extLst>
+                  <a:ext uri="{0D108BD9-81ED-4DB2-BD59-A6C34878D82A}">
+                    <a16:rowId xmlns:a16="http://schemas.microsoft.com/office/drawing/2014/main" val="10001"/>
+                  </a:ext>
+                </a:extLst>
               </a:tr>
               <a:tr h="370840">
                 <a:tc>
@@ -20358,15 +20408,15 @@
                     <a:lstStyle/>
                     <a:p>
                       <a:r>
-                        <a:rPr lang="es-AR" dirty="0" err="1" smtClean="0"/>
+                        <a:rPr lang="es-AR" dirty="0" err="1"/>
                         <a:t>perimetro</a:t>
                       </a:r>
                       <a:r>
-                        <a:rPr lang="es-AR" dirty="0" smtClean="0"/>
+                        <a:rPr lang="es-AR" dirty="0"/>
                         <a:t>() : </a:t>
                       </a:r>
                       <a:r>
-                        <a:rPr lang="es-AR" dirty="0" err="1" smtClean="0"/>
+                        <a:rPr lang="es-AR" dirty="0" err="1"/>
                         <a:t>void</a:t>
                       </a:r>
                       <a:endParaRPr lang="es-AR" dirty="0"/>
@@ -20374,6 +20424,11 @@
                   </a:txBody>
                   <a:tcPr/>
                 </a:tc>
+                <a:extLst>
+                  <a:ext uri="{0D108BD9-81ED-4DB2-BD59-A6C34878D82A}">
+                    <a16:rowId xmlns:a16="http://schemas.microsoft.com/office/drawing/2014/main" val="10002"/>
+                  </a:ext>
+                </a:extLst>
               </a:tr>
             </a:tbl>
           </a:graphicData>
@@ -20404,7 +20459,13 @@
                 <a:tableStyleId>{5C22544A-7EE6-4342-B048-85BDC9FD1C3A}</a:tableStyleId>
               </a:tblPr>
               <a:tblGrid>
-                <a:gridCol w="3081020"/>
+                <a:gridCol w="3081020">
+                  <a:extLst>
+                    <a:ext uri="{9D8B030D-6E8A-4147-A177-3AD203B41FA5}">
+                      <a16:colId xmlns:a16="http://schemas.microsoft.com/office/drawing/2014/main" val="20000"/>
+                    </a:ext>
+                  </a:extLst>
+                </a:gridCol>
               </a:tblGrid>
               <a:tr h="370840">
                 <a:tc>
@@ -20413,14 +20474,18 @@
                     <a:lstStyle/>
                     <a:p>
                       <a:r>
-                        <a:rPr lang="es-AR" dirty="0" smtClean="0"/>
+                        <a:rPr lang="es-AR" dirty="0"/>
                         <a:t>Triangulo</a:t>
                       </a:r>
-                      <a:endParaRPr lang="es-AR" dirty="0"/>
                     </a:p>
                   </a:txBody>
                   <a:tcPr/>
                 </a:tc>
+                <a:extLst>
+                  <a:ext uri="{0D108BD9-81ED-4DB2-BD59-A6C34878D82A}">
+                    <a16:rowId xmlns:a16="http://schemas.microsoft.com/office/drawing/2014/main" val="10000"/>
+                  </a:ext>
+                </a:extLst>
               </a:tr>
               <a:tr h="370840">
                 <a:tc>
@@ -20429,15 +20494,15 @@
                     <a:lstStyle/>
                     <a:p>
                       <a:r>
-                        <a:rPr lang="es-AR" dirty="0" err="1" smtClean="0"/>
+                        <a:rPr lang="es-AR" dirty="0" err="1"/>
                         <a:t>area</a:t>
                       </a:r>
                       <a:r>
-                        <a:rPr lang="es-AR" dirty="0" smtClean="0"/>
+                        <a:rPr lang="es-AR" dirty="0"/>
                         <a:t>() : </a:t>
                       </a:r>
                       <a:r>
-                        <a:rPr lang="es-AR" dirty="0" err="1" smtClean="0"/>
+                        <a:rPr lang="es-AR" dirty="0" err="1"/>
                         <a:t>void</a:t>
                       </a:r>
                       <a:endParaRPr lang="es-AR" dirty="0"/>
@@ -20445,6 +20510,11 @@
                   </a:txBody>
                   <a:tcPr/>
                 </a:tc>
+                <a:extLst>
+                  <a:ext uri="{0D108BD9-81ED-4DB2-BD59-A6C34878D82A}">
+                    <a16:rowId xmlns:a16="http://schemas.microsoft.com/office/drawing/2014/main" val="10001"/>
+                  </a:ext>
+                </a:extLst>
               </a:tr>
               <a:tr h="370840">
                 <a:tc>
@@ -20453,15 +20523,15 @@
                     <a:lstStyle/>
                     <a:p>
                       <a:r>
-                        <a:rPr lang="es-AR" dirty="0" err="1" smtClean="0"/>
+                        <a:rPr lang="es-AR" dirty="0" err="1"/>
                         <a:t>perimetro</a:t>
                       </a:r>
                       <a:r>
-                        <a:rPr lang="es-AR" dirty="0" smtClean="0"/>
+                        <a:rPr lang="es-AR" dirty="0"/>
                         <a:t>() : </a:t>
                       </a:r>
                       <a:r>
-                        <a:rPr lang="es-AR" dirty="0" err="1" smtClean="0"/>
+                        <a:rPr lang="es-AR" dirty="0" err="1"/>
                         <a:t>void</a:t>
                       </a:r>
                       <a:endParaRPr lang="es-AR" dirty="0"/>
@@ -20469,6 +20539,11 @@
                   </a:txBody>
                   <a:tcPr/>
                 </a:tc>
+                <a:extLst>
+                  <a:ext uri="{0D108BD9-81ED-4DB2-BD59-A6C34878D82A}">
+                    <a16:rowId xmlns:a16="http://schemas.microsoft.com/office/drawing/2014/main" val="10002"/>
+                  </a:ext>
+                </a:extLst>
               </a:tr>
             </a:tbl>
           </a:graphicData>
@@ -21040,21 +21115,7 @@
                 <a:latin typeface="Franklin Gothic Medium" panose="020B0603020102020204" pitchFamily="34" charset="0"/>
                 <a:sym typeface="Wingdings" pitchFamily="2" charset="2"/>
               </a:rPr>
-              <a:t>Es una abstracción de un objeto</a:t>
-            </a:r>
-            <a:r>
-              <a:rPr lang="es-ES" sz="2800" dirty="0" smtClean="0">
-                <a:effectLst>
-                  <a:outerShdw blurRad="38100" dist="38100" dir="2700000" algn="tl">
-                    <a:srgbClr val="000000">
-                      <a:alpha val="43137"/>
-                    </a:srgbClr>
-                  </a:outerShdw>
-                </a:effectLst>
-                <a:latin typeface="Franklin Gothic Medium" panose="020B0603020102020204" pitchFamily="34" charset="0"/>
-                <a:sym typeface="Wingdings" pitchFamily="2" charset="2"/>
-              </a:rPr>
-              <a:t>.</a:t>
+              <a:t>Es una abstracción de un objeto.</a:t>
             </a:r>
             <a:endParaRPr lang="es-AR" sz="2800" dirty="0">
               <a:effectLst>
@@ -21080,13 +21141,6 @@
   <p:clrMapOvr>
     <a:masterClrMapping/>
   </p:clrMapOvr>
-  <p:timing>
-    <p:tnLst>
-      <p:par>
-        <p:cTn id="1" dur="indefinite" restart="never" nodeType="tmRoot"/>
-      </p:par>
-    </p:tnLst>
-  </p:timing>
 </p:sld>
 </file>
 
@@ -21123,10 +21177,9 @@
           <a:lstStyle/>
           <a:p>
             <a:r>
-              <a:rPr lang="es-AR" dirty="0" smtClean="0"/>
+              <a:rPr lang="es-AR" dirty="0"/>
               <a:t>Sintaxis</a:t>
             </a:r>
-            <a:endParaRPr lang="es-AR" dirty="0"/>
           </a:p>
         </p:txBody>
       </p:sp>
@@ -21291,7 +21344,7 @@
               <a:t>	Ejemplo: </a:t>
             </a:r>
             <a:r>
-              <a:rPr lang="es-ES" sz="2400" dirty="0" err="1" smtClean="0">
+              <a:rPr lang="es-ES" sz="2400" dirty="0" err="1">
                 <a:effectLst>
                   <a:outerShdw blurRad="38100" dist="38100" dir="2700000" algn="tl">
                     <a:srgbClr val="000000">
@@ -21698,7 +21751,7 @@
               <a:buNone/>
             </a:pPr>
             <a:r>
-              <a:rPr lang="es-AR" altLang="es-AR" sz="2000" b="1" dirty="0" smtClean="0">
+              <a:rPr lang="es-AR" altLang="es-AR" sz="2000" b="1" dirty="0">
                 <a:solidFill>
                   <a:srgbClr val="000000"/>
                 </a:solidFill>
@@ -21708,24 +21761,14 @@
               <a:t>        </a:t>
             </a:r>
             <a:r>
-              <a:rPr lang="es-AR" altLang="es-AR" sz="2000" b="1" dirty="0" smtClean="0">
+              <a:rPr lang="es-AR" altLang="es-AR" sz="2000" b="1" dirty="0">
                 <a:solidFill>
                   <a:srgbClr val="66CC66"/>
                 </a:solidFill>
                 <a:latin typeface="Arial Narrow" panose="020B0606020202030204" pitchFamily="34" charset="0"/>
                 <a:cs typeface="Times New Roman" panose="02020603050405020304" pitchFamily="18" charset="0"/>
               </a:rPr>
-              <a:t>// </a:t>
-            </a:r>
-            <a:r>
-              <a:rPr lang="es-AR" altLang="es-AR" sz="2000" b="1" dirty="0">
-                <a:solidFill>
-                  <a:srgbClr val="66CC66"/>
-                </a:solidFill>
-                <a:latin typeface="Arial Narrow" panose="020B0606020202030204" pitchFamily="34" charset="0"/>
-                <a:cs typeface="Times New Roman" panose="02020603050405020304" pitchFamily="18" charset="0"/>
-              </a:rPr>
-              <a:t>miembros: atributos y métodos</a:t>
+              <a:t>// miembros: atributos y métodos</a:t>
             </a:r>
           </a:p>
           <a:p>
@@ -21766,13 +21809,6 @@
   <p:clrMapOvr>
     <a:masterClrMapping/>
   </p:clrMapOvr>
-  <p:timing>
-    <p:tnLst>
-      <p:par>
-        <p:cTn id="1" dur="indefinite" restart="never" nodeType="tmRoot"/>
-      </p:par>
-    </p:tnLst>
-  </p:timing>
 </p:sld>
 </file>
 

</xml_diff>